<commit_message>
Minor tweak to ppt
</commit_message>
<xml_diff>
--- a/Presentation1.pptx
+++ b/Presentation1.pptx
@@ -4308,155 +4308,62 @@
           <a:chExt cx="0" cy="0"/>
         </a:xfrm>
       </p:grpSpPr>
-      <p:cxnSp>
-        <p:nvCxnSpPr>
-          <p:cNvPr id="56" name="Straight Connector 55"/>
-          <p:cNvCxnSpPr/>
-          <p:nvPr/>
-        </p:nvCxnSpPr>
-        <p:spPr>
-          <a:xfrm flipV="1">
-            <a:off x="4568822" y="1787814"/>
-            <a:ext cx="6357" cy="187678"/>
-          </a:xfrm>
-          <a:prstGeom prst="line">
-            <a:avLst/>
-          </a:prstGeom>
-          <a:ln>
-            <a:prstDash val="dash"/>
-          </a:ln>
-        </p:spPr>
-        <p:style>
-          <a:lnRef idx="1">
-            <a:schemeClr val="dk1"/>
-          </a:lnRef>
-          <a:fillRef idx="0">
-            <a:schemeClr val="dk1"/>
-          </a:fillRef>
-          <a:effectRef idx="0">
-            <a:schemeClr val="dk1"/>
-          </a:effectRef>
-          <a:fontRef idx="minor">
-            <a:schemeClr val="tx1"/>
-          </a:fontRef>
-        </p:style>
-      </p:cxnSp>
-      <p:sp>
-        <p:nvSpPr>
-          <p:cNvPr id="4" name="Rectangle 3"/>
-          <p:cNvSpPr/>
-          <p:nvPr/>
-        </p:nvSpPr>
-        <p:spPr>
-          <a:xfrm>
-            <a:off x="2843306" y="97011"/>
-            <a:ext cx="3457388" cy="679076"/>
-          </a:xfrm>
-          <a:prstGeom prst="rect">
-            <a:avLst/>
-          </a:prstGeom>
-        </p:spPr>
-        <p:style>
-          <a:lnRef idx="2">
-            <a:schemeClr val="dk1"/>
-          </a:lnRef>
-          <a:fillRef idx="1">
-            <a:schemeClr val="lt1"/>
-          </a:fillRef>
-          <a:effectRef idx="0">
-            <a:schemeClr val="dk1"/>
-          </a:effectRef>
-          <a:fontRef idx="minor">
-            <a:schemeClr val="dk1"/>
-          </a:fontRef>
-        </p:style>
-        <p:txBody>
-          <a:bodyPr rtlCol="0" anchor="ctr"/>
-          <a:lstStyle/>
-          <a:p>
-            <a:pPr algn="ctr"/>
-            <a:r>
-              <a:rPr lang="en-US" i="1" dirty="0" smtClean="0"/>
-              <a:t>&lt;&lt;interface&gt;&gt;</a:t>
-            </a:r>
-          </a:p>
-          <a:p>
-            <a:pPr algn="ctr"/>
-            <a:r>
-              <a:rPr lang="en-US" b="1" dirty="0" smtClean="0"/>
-              <a:t>Processor</a:t>
-            </a:r>
-            <a:endParaRPr lang="en-US" b="1" dirty="0"/>
-          </a:p>
-        </p:txBody>
-      </p:sp>
-      <p:sp>
-        <p:nvSpPr>
-          <p:cNvPr id="5" name="Rectangle 4"/>
-          <p:cNvSpPr/>
-          <p:nvPr/>
-        </p:nvSpPr>
-        <p:spPr>
-          <a:xfrm>
-            <a:off x="2843306" y="776086"/>
-            <a:ext cx="3457388" cy="926011"/>
-          </a:xfrm>
-          <a:prstGeom prst="rect">
-            <a:avLst/>
-          </a:prstGeom>
-        </p:spPr>
-        <p:style>
-          <a:lnRef idx="2">
-            <a:schemeClr val="dk1"/>
-          </a:lnRef>
-          <a:fillRef idx="1">
-            <a:schemeClr val="lt1"/>
-          </a:fillRef>
-          <a:effectRef idx="0">
-            <a:schemeClr val="dk1"/>
-          </a:effectRef>
-          <a:fontRef idx="minor">
-            <a:schemeClr val="dk1"/>
-          </a:fontRef>
-        </p:style>
-        <p:txBody>
-          <a:bodyPr rtlCol="0" anchor="ctr"/>
-          <a:lstStyle/>
-          <a:p>
-            <a:r>
-              <a:rPr lang="en-US" sz="1200" smtClean="0"/>
-              <a:t>+process(</a:t>
-            </a:r>
-            <a:r>
-              <a:rPr lang="en-US" sz="1200" dirty="0" smtClean="0"/>
-              <a:t>) : void</a:t>
-            </a:r>
-          </a:p>
-        </p:txBody>
-      </p:sp>
       <p:grpSp>
         <p:nvGrpSpPr>
-          <p:cNvPr id="66" name="Group 65"/>
+          <p:cNvPr id="90" name="Group 89"/>
           <p:cNvGrpSpPr/>
           <p:nvPr/>
         </p:nvGrpSpPr>
         <p:grpSpPr>
           <a:xfrm>
-            <a:off x="877982" y="2163170"/>
-            <a:ext cx="7388037" cy="879442"/>
-            <a:chOff x="1149046" y="2163170"/>
-            <a:chExt cx="7388037" cy="879442"/>
+            <a:off x="429352" y="97011"/>
+            <a:ext cx="8285294" cy="5807953"/>
+            <a:chOff x="429352" y="97011"/>
+            <a:chExt cx="8285294" cy="5807953"/>
           </a:xfrm>
         </p:grpSpPr>
+        <p:cxnSp>
+          <p:nvCxnSpPr>
+            <p:cNvPr id="56" name="Straight Connector 55"/>
+            <p:cNvCxnSpPr/>
+            <p:nvPr/>
+          </p:nvCxnSpPr>
+          <p:spPr>
+            <a:xfrm flipV="1">
+              <a:off x="4568822" y="1787814"/>
+              <a:ext cx="6357" cy="187678"/>
+            </a:xfrm>
+            <a:prstGeom prst="line">
+              <a:avLst/>
+            </a:prstGeom>
+            <a:ln>
+              <a:prstDash val="dash"/>
+            </a:ln>
+          </p:spPr>
+          <p:style>
+            <a:lnRef idx="1">
+              <a:schemeClr val="dk1"/>
+            </a:lnRef>
+            <a:fillRef idx="0">
+              <a:schemeClr val="dk1"/>
+            </a:fillRef>
+            <a:effectRef idx="0">
+              <a:schemeClr val="dk1"/>
+            </a:effectRef>
+            <a:fontRef idx="minor">
+              <a:schemeClr val="tx1"/>
+            </a:fontRef>
+          </p:style>
+        </p:cxnSp>
         <p:sp>
           <p:nvSpPr>
-            <p:cNvPr id="7" name="Rectangle 6"/>
+            <p:cNvPr id="4" name="Rectangle 3"/>
             <p:cNvSpPr/>
             <p:nvPr/>
           </p:nvSpPr>
           <p:spPr>
             <a:xfrm>
-              <a:off x="1149046" y="2163170"/>
+              <a:off x="2843306" y="97011"/>
               <a:ext cx="3457388" cy="679076"/>
             </a:xfrm>
             <a:prstGeom prst="rect">
@@ -4484,14 +4391,14 @@
               <a:pPr algn="ctr"/>
               <a:r>
                 <a:rPr lang="en-US" i="1" dirty="0" smtClean="0"/>
-                <a:t>&lt;&lt;abstract&gt;&gt;</a:t>
+                <a:t>&lt;&lt;interface&gt;&gt;</a:t>
               </a:r>
             </a:p>
             <a:p>
               <a:pPr algn="ctr"/>
               <a:r>
                 <a:rPr lang="en-US" b="1" dirty="0" smtClean="0"/>
-                <a:t>Shifter</a:t>
+                <a:t>Processor</a:t>
               </a:r>
               <a:endParaRPr lang="en-US" b="1" dirty="0"/>
             </a:p>
@@ -4499,14 +4406,388 @@
         </p:sp>
         <p:sp>
           <p:nvSpPr>
-            <p:cNvPr id="8" name="Rectangle 7"/>
+            <p:cNvPr id="5" name="Rectangle 4"/>
             <p:cNvSpPr/>
             <p:nvPr/>
           </p:nvSpPr>
           <p:spPr>
             <a:xfrm>
-              <a:off x="1149046" y="2842246"/>
-              <a:ext cx="3457388" cy="200366"/>
+              <a:off x="2843306" y="776086"/>
+              <a:ext cx="3457388" cy="926011"/>
+            </a:xfrm>
+            <a:prstGeom prst="rect">
+              <a:avLst/>
+            </a:prstGeom>
+          </p:spPr>
+          <p:style>
+            <a:lnRef idx="2">
+              <a:schemeClr val="dk1"/>
+            </a:lnRef>
+            <a:fillRef idx="1">
+              <a:schemeClr val="lt1"/>
+            </a:fillRef>
+            <a:effectRef idx="0">
+              <a:schemeClr val="dk1"/>
+            </a:effectRef>
+            <a:fontRef idx="minor">
+              <a:schemeClr val="dk1"/>
+            </a:fontRef>
+          </p:style>
+          <p:txBody>
+            <a:bodyPr rtlCol="0" anchor="ctr"/>
+            <a:lstStyle/>
+            <a:p>
+              <a:r>
+                <a:rPr lang="en-US" sz="1200" dirty="0" smtClean="0"/>
+                <a:t>+process() : void</a:t>
+              </a:r>
+            </a:p>
+          </p:txBody>
+        </p:sp>
+        <p:grpSp>
+          <p:nvGrpSpPr>
+            <p:cNvPr id="66" name="Group 65"/>
+            <p:cNvGrpSpPr/>
+            <p:nvPr/>
+          </p:nvGrpSpPr>
+          <p:grpSpPr>
+            <a:xfrm>
+              <a:off x="877982" y="2163170"/>
+              <a:ext cx="7388037" cy="879442"/>
+              <a:chOff x="1149046" y="2163170"/>
+              <a:chExt cx="7388037" cy="879442"/>
+            </a:xfrm>
+          </p:grpSpPr>
+          <p:sp>
+            <p:nvSpPr>
+              <p:cNvPr id="7" name="Rectangle 6"/>
+              <p:cNvSpPr/>
+              <p:nvPr/>
+            </p:nvSpPr>
+            <p:spPr>
+              <a:xfrm>
+                <a:off x="1149046" y="2163170"/>
+                <a:ext cx="3457388" cy="679076"/>
+              </a:xfrm>
+              <a:prstGeom prst="rect">
+                <a:avLst/>
+              </a:prstGeom>
+            </p:spPr>
+            <p:style>
+              <a:lnRef idx="2">
+                <a:schemeClr val="dk1"/>
+              </a:lnRef>
+              <a:fillRef idx="1">
+                <a:schemeClr val="lt1"/>
+              </a:fillRef>
+              <a:effectRef idx="0">
+                <a:schemeClr val="dk1"/>
+              </a:effectRef>
+              <a:fontRef idx="minor">
+                <a:schemeClr val="dk1"/>
+              </a:fontRef>
+            </p:style>
+            <p:txBody>
+              <a:bodyPr rtlCol="0" anchor="ctr"/>
+              <a:lstStyle/>
+              <a:p>
+                <a:pPr algn="ctr"/>
+                <a:r>
+                  <a:rPr lang="en-US" i="1" dirty="0" smtClean="0"/>
+                  <a:t>&lt;&lt;abstract&gt;&gt;</a:t>
+                </a:r>
+              </a:p>
+              <a:p>
+                <a:pPr algn="ctr"/>
+                <a:r>
+                  <a:rPr lang="en-US" b="1" dirty="0" smtClean="0"/>
+                  <a:t>Shifter</a:t>
+                </a:r>
+                <a:endParaRPr lang="en-US" b="1" dirty="0"/>
+              </a:p>
+            </p:txBody>
+          </p:sp>
+          <p:sp>
+            <p:nvSpPr>
+              <p:cNvPr id="8" name="Rectangle 7"/>
+              <p:cNvSpPr/>
+              <p:nvPr/>
+            </p:nvSpPr>
+            <p:spPr>
+              <a:xfrm>
+                <a:off x="1149046" y="2842246"/>
+                <a:ext cx="3457388" cy="200366"/>
+              </a:xfrm>
+              <a:prstGeom prst="rect">
+                <a:avLst/>
+              </a:prstGeom>
+            </p:spPr>
+            <p:style>
+              <a:lnRef idx="2">
+                <a:schemeClr val="dk1"/>
+              </a:lnRef>
+              <a:fillRef idx="1">
+                <a:schemeClr val="lt1"/>
+              </a:fillRef>
+              <a:effectRef idx="0">
+                <a:schemeClr val="dk1"/>
+              </a:effectRef>
+              <a:fontRef idx="minor">
+                <a:schemeClr val="dk1"/>
+              </a:fontRef>
+            </p:style>
+            <p:txBody>
+              <a:bodyPr rtlCol="0" anchor="ctr"/>
+              <a:lstStyle/>
+              <a:p>
+                <a:endParaRPr lang="en-US" sz="1200" b="1" i="1" dirty="0"/>
+              </a:p>
+            </p:txBody>
+          </p:sp>
+          <p:sp>
+            <p:nvSpPr>
+              <p:cNvPr id="9" name="Rectangle 8"/>
+              <p:cNvSpPr/>
+              <p:nvPr/>
+            </p:nvSpPr>
+            <p:spPr>
+              <a:xfrm>
+                <a:off x="5079695" y="2163170"/>
+                <a:ext cx="3457388" cy="679076"/>
+              </a:xfrm>
+              <a:prstGeom prst="rect">
+                <a:avLst/>
+              </a:prstGeom>
+            </p:spPr>
+            <p:style>
+              <a:lnRef idx="2">
+                <a:schemeClr val="dk1"/>
+              </a:lnRef>
+              <a:fillRef idx="1">
+                <a:schemeClr val="lt1"/>
+              </a:fillRef>
+              <a:effectRef idx="0">
+                <a:schemeClr val="dk1"/>
+              </a:effectRef>
+              <a:fontRef idx="minor">
+                <a:schemeClr val="dk1"/>
+              </a:fontRef>
+            </p:style>
+            <p:txBody>
+              <a:bodyPr rtlCol="0" anchor="ctr"/>
+              <a:lstStyle/>
+              <a:p>
+                <a:pPr algn="ctr"/>
+                <a:r>
+                  <a:rPr lang="en-US" i="1" dirty="0" smtClean="0"/>
+                  <a:t>&lt;&lt;abstract&gt;&gt;</a:t>
+                </a:r>
+              </a:p>
+              <a:p>
+                <a:pPr algn="ctr"/>
+                <a:r>
+                  <a:rPr lang="en-US" b="1" dirty="0" smtClean="0"/>
+                  <a:t>Sorter</a:t>
+                </a:r>
+                <a:endParaRPr lang="en-US" b="1" dirty="0"/>
+              </a:p>
+            </p:txBody>
+          </p:sp>
+          <p:sp>
+            <p:nvSpPr>
+              <p:cNvPr id="10" name="Rectangle 9"/>
+              <p:cNvSpPr/>
+              <p:nvPr/>
+            </p:nvSpPr>
+            <p:spPr>
+              <a:xfrm>
+                <a:off x="5079695" y="2842245"/>
+                <a:ext cx="3457388" cy="200367"/>
+              </a:xfrm>
+              <a:prstGeom prst="rect">
+                <a:avLst/>
+              </a:prstGeom>
+            </p:spPr>
+            <p:style>
+              <a:lnRef idx="2">
+                <a:schemeClr val="dk1"/>
+              </a:lnRef>
+              <a:fillRef idx="1">
+                <a:schemeClr val="lt1"/>
+              </a:fillRef>
+              <a:effectRef idx="0">
+                <a:schemeClr val="dk1"/>
+              </a:effectRef>
+              <a:fontRef idx="minor">
+                <a:schemeClr val="dk1"/>
+              </a:fontRef>
+            </p:style>
+            <p:txBody>
+              <a:bodyPr rtlCol="0" anchor="ctr"/>
+              <a:lstStyle/>
+              <a:p>
+                <a:endParaRPr lang="en-US" sz="1200" b="1" i="1" dirty="0"/>
+              </a:p>
+            </p:txBody>
+          </p:sp>
+        </p:grpSp>
+        <p:grpSp>
+          <p:nvGrpSpPr>
+            <p:cNvPr id="69" name="Group 68"/>
+            <p:cNvGrpSpPr/>
+            <p:nvPr/>
+          </p:nvGrpSpPr>
+          <p:grpSpPr>
+            <a:xfrm>
+              <a:off x="429352" y="3599998"/>
+              <a:ext cx="1829608" cy="879442"/>
+              <a:chOff x="639961" y="3611982"/>
+              <a:chExt cx="1829608" cy="879442"/>
+            </a:xfrm>
+          </p:grpSpPr>
+          <p:sp>
+            <p:nvSpPr>
+              <p:cNvPr id="11" name="Rectangle 10"/>
+              <p:cNvSpPr/>
+              <p:nvPr/>
+            </p:nvSpPr>
+            <p:spPr>
+              <a:xfrm>
+                <a:off x="639961" y="3611982"/>
+                <a:ext cx="1829608" cy="679076"/>
+              </a:xfrm>
+              <a:prstGeom prst="rect">
+                <a:avLst/>
+              </a:prstGeom>
+            </p:spPr>
+            <p:style>
+              <a:lnRef idx="2">
+                <a:schemeClr val="dk1"/>
+              </a:lnRef>
+              <a:fillRef idx="1">
+                <a:schemeClr val="lt1"/>
+              </a:fillRef>
+              <a:effectRef idx="0">
+                <a:schemeClr val="dk1"/>
+              </a:effectRef>
+              <a:fontRef idx="minor">
+                <a:schemeClr val="dk1"/>
+              </a:fontRef>
+            </p:style>
+            <p:txBody>
+              <a:bodyPr rtlCol="0" anchor="ctr"/>
+              <a:lstStyle/>
+              <a:p>
+                <a:pPr algn="ctr"/>
+                <a:r>
+                  <a:rPr lang="en-US" b="1" dirty="0" err="1" smtClean="0"/>
+                  <a:t>CircularShifter</a:t>
+                </a:r>
+                <a:endParaRPr lang="en-US" b="1" dirty="0"/>
+              </a:p>
+            </p:txBody>
+          </p:sp>
+          <p:sp>
+            <p:nvSpPr>
+              <p:cNvPr id="12" name="Rectangle 11"/>
+              <p:cNvSpPr/>
+              <p:nvPr/>
+            </p:nvSpPr>
+            <p:spPr>
+              <a:xfrm>
+                <a:off x="639961" y="4291058"/>
+                <a:ext cx="1829608" cy="200366"/>
+              </a:xfrm>
+              <a:prstGeom prst="rect">
+                <a:avLst/>
+              </a:prstGeom>
+            </p:spPr>
+            <p:style>
+              <a:lnRef idx="2">
+                <a:schemeClr val="dk1"/>
+              </a:lnRef>
+              <a:fillRef idx="1">
+                <a:schemeClr val="lt1"/>
+              </a:fillRef>
+              <a:effectRef idx="0">
+                <a:schemeClr val="dk1"/>
+              </a:effectRef>
+              <a:fontRef idx="minor">
+                <a:schemeClr val="dk1"/>
+              </a:fontRef>
+            </p:style>
+            <p:txBody>
+              <a:bodyPr rtlCol="0" anchor="ctr"/>
+              <a:lstStyle/>
+              <a:p>
+                <a:endParaRPr lang="en-US" sz="1200" b="1" i="1" dirty="0"/>
+              </a:p>
+            </p:txBody>
+          </p:sp>
+        </p:grpSp>
+        <p:sp>
+          <p:nvSpPr>
+            <p:cNvPr id="13" name="Rectangle 12"/>
+            <p:cNvSpPr/>
+            <p:nvPr/>
+          </p:nvSpPr>
+          <p:spPr>
+            <a:xfrm>
+              <a:off x="429352" y="5025522"/>
+              <a:ext cx="1829608" cy="679076"/>
+            </a:xfrm>
+            <a:prstGeom prst="rect">
+              <a:avLst/>
+            </a:prstGeom>
+          </p:spPr>
+          <p:style>
+            <a:lnRef idx="2">
+              <a:schemeClr val="dk1"/>
+            </a:lnRef>
+            <a:fillRef idx="1">
+              <a:schemeClr val="lt1"/>
+            </a:fillRef>
+            <a:effectRef idx="0">
+              <a:schemeClr val="dk1"/>
+            </a:effectRef>
+            <a:fontRef idx="minor">
+              <a:schemeClr val="dk1"/>
+            </a:fontRef>
+          </p:style>
+          <p:txBody>
+            <a:bodyPr rtlCol="0" anchor="ctr"/>
+            <a:lstStyle/>
+            <a:p>
+              <a:pPr algn="ctr"/>
+              <a:r>
+                <a:rPr lang="en-US" sz="1400" b="1" dirty="0" err="1" smtClean="0"/>
+                <a:t>CircularShifter</a:t>
+              </a:r>
+              <a:r>
+                <a:rPr lang="en-US" sz="1400" b="1" dirty="0" smtClean="0"/>
+                <a:t/>
+              </a:r>
+              <a:br>
+                <a:rPr lang="en-US" sz="1400" b="1" dirty="0" smtClean="0"/>
+              </a:br>
+              <a:r>
+                <a:rPr lang="en-US" sz="1400" b="1" dirty="0" err="1" smtClean="0"/>
+                <a:t>IgnoreWords</a:t>
+              </a:r>
+              <a:endParaRPr lang="en-US" sz="1400" b="1" dirty="0"/>
+            </a:p>
+          </p:txBody>
+        </p:sp>
+        <p:sp>
+          <p:nvSpPr>
+            <p:cNvPr id="14" name="Rectangle 13"/>
+            <p:cNvSpPr/>
+            <p:nvPr/>
+          </p:nvSpPr>
+          <p:spPr>
+            <a:xfrm>
+              <a:off x="429352" y="5704598"/>
+              <a:ext cx="1829608" cy="200366"/>
             </a:xfrm>
             <a:prstGeom prst="rect">
               <a:avLst/>
@@ -4534,658 +4815,239 @@
             </a:p>
           </p:txBody>
         </p:sp>
+        <p:grpSp>
+          <p:nvGrpSpPr>
+            <p:cNvPr id="71" name="Group 70"/>
+            <p:cNvGrpSpPr/>
+            <p:nvPr/>
+          </p:nvGrpSpPr>
+          <p:grpSpPr>
+            <a:xfrm>
+              <a:off x="4950284" y="3599998"/>
+              <a:ext cx="1667505" cy="879442"/>
+              <a:chOff x="5106155" y="3575306"/>
+              <a:chExt cx="1667505" cy="879442"/>
+            </a:xfrm>
+          </p:grpSpPr>
+          <p:sp>
+            <p:nvSpPr>
+              <p:cNvPr id="15" name="Rectangle 14"/>
+              <p:cNvSpPr/>
+              <p:nvPr/>
+            </p:nvSpPr>
+            <p:spPr>
+              <a:xfrm>
+                <a:off x="5106155" y="3575306"/>
+                <a:ext cx="1667505" cy="679076"/>
+              </a:xfrm>
+              <a:prstGeom prst="rect">
+                <a:avLst/>
+              </a:prstGeom>
+            </p:spPr>
+            <p:style>
+              <a:lnRef idx="2">
+                <a:schemeClr val="dk1"/>
+              </a:lnRef>
+              <a:fillRef idx="1">
+                <a:schemeClr val="lt1"/>
+              </a:fillRef>
+              <a:effectRef idx="0">
+                <a:schemeClr val="dk1"/>
+              </a:effectRef>
+              <a:fontRef idx="minor">
+                <a:schemeClr val="dk1"/>
+              </a:fontRef>
+            </p:style>
+            <p:txBody>
+              <a:bodyPr rtlCol="0" anchor="ctr"/>
+              <a:lstStyle/>
+              <a:p>
+                <a:pPr algn="ctr"/>
+                <a:r>
+                  <a:rPr lang="en-US" b="1" dirty="0" smtClean="0"/>
+                  <a:t>Alphabetical</a:t>
+                </a:r>
+                <a:br>
+                  <a:rPr lang="en-US" b="1" dirty="0" smtClean="0"/>
+                </a:br>
+                <a:r>
+                  <a:rPr lang="en-US" b="1" dirty="0" smtClean="0"/>
+                  <a:t>Sorter</a:t>
+                </a:r>
+                <a:endParaRPr lang="en-US" b="1" dirty="0"/>
+              </a:p>
+            </p:txBody>
+          </p:sp>
+          <p:sp>
+            <p:nvSpPr>
+              <p:cNvPr id="16" name="Rectangle 15"/>
+              <p:cNvSpPr/>
+              <p:nvPr/>
+            </p:nvSpPr>
+            <p:spPr>
+              <a:xfrm>
+                <a:off x="5106155" y="4254382"/>
+                <a:ext cx="1667505" cy="200366"/>
+              </a:xfrm>
+              <a:prstGeom prst="rect">
+                <a:avLst/>
+              </a:prstGeom>
+            </p:spPr>
+            <p:style>
+              <a:lnRef idx="2">
+                <a:schemeClr val="dk1"/>
+              </a:lnRef>
+              <a:fillRef idx="1">
+                <a:schemeClr val="lt1"/>
+              </a:fillRef>
+              <a:effectRef idx="0">
+                <a:schemeClr val="dk1"/>
+              </a:effectRef>
+              <a:fontRef idx="minor">
+                <a:schemeClr val="dk1"/>
+              </a:fontRef>
+            </p:style>
+            <p:txBody>
+              <a:bodyPr rtlCol="0" anchor="ctr"/>
+              <a:lstStyle/>
+              <a:p>
+                <a:endParaRPr lang="en-US" sz="1200" b="1" i="1" dirty="0"/>
+              </a:p>
+            </p:txBody>
+          </p:sp>
+        </p:grpSp>
+        <p:grpSp>
+          <p:nvGrpSpPr>
+            <p:cNvPr id="70" name="Group 69"/>
+            <p:cNvGrpSpPr/>
+            <p:nvPr/>
+          </p:nvGrpSpPr>
+          <p:grpSpPr>
+            <a:xfrm>
+              <a:off x="2688312" y="3599998"/>
+              <a:ext cx="1832620" cy="879442"/>
+              <a:chOff x="2773815" y="3611982"/>
+              <a:chExt cx="1832620" cy="879442"/>
+            </a:xfrm>
+          </p:grpSpPr>
+          <p:sp>
+            <p:nvSpPr>
+              <p:cNvPr id="17" name="Rectangle 16"/>
+              <p:cNvSpPr/>
+              <p:nvPr/>
+            </p:nvSpPr>
+            <p:spPr>
+              <a:xfrm>
+                <a:off x="2773815" y="3611982"/>
+                <a:ext cx="1832620" cy="679076"/>
+              </a:xfrm>
+              <a:prstGeom prst="rect">
+                <a:avLst/>
+              </a:prstGeom>
+              <a:ln>
+                <a:solidFill>
+                  <a:srgbClr val="A6A6A6"/>
+                </a:solidFill>
+              </a:ln>
+            </p:spPr>
+            <p:style>
+              <a:lnRef idx="2">
+                <a:schemeClr val="dk1"/>
+              </a:lnRef>
+              <a:fillRef idx="1">
+                <a:schemeClr val="lt1"/>
+              </a:fillRef>
+              <a:effectRef idx="0">
+                <a:schemeClr val="dk1"/>
+              </a:effectRef>
+              <a:fontRef idx="minor">
+                <a:schemeClr val="dk1"/>
+              </a:fontRef>
+            </p:style>
+            <p:txBody>
+              <a:bodyPr rtlCol="0" anchor="ctr"/>
+              <a:lstStyle/>
+              <a:p>
+                <a:pPr algn="ctr"/>
+                <a:r>
+                  <a:rPr lang="en-US" b="1" dirty="0" err="1" smtClean="0">
+                    <a:solidFill>
+                      <a:schemeClr val="bg1">
+                        <a:lumMod val="50000"/>
+                      </a:schemeClr>
+                    </a:solidFill>
+                  </a:rPr>
+                  <a:t>RandomShifter</a:t>
+                </a:r>
+                <a:endParaRPr lang="en-US" b="1" dirty="0">
+                  <a:solidFill>
+                    <a:schemeClr val="bg1">
+                      <a:lumMod val="50000"/>
+                    </a:schemeClr>
+                  </a:solidFill>
+                </a:endParaRPr>
+              </a:p>
+            </p:txBody>
+          </p:sp>
+          <p:sp>
+            <p:nvSpPr>
+              <p:cNvPr id="18" name="Rectangle 17"/>
+              <p:cNvSpPr/>
+              <p:nvPr/>
+            </p:nvSpPr>
+            <p:spPr>
+              <a:xfrm>
+                <a:off x="2773815" y="4291058"/>
+                <a:ext cx="1832620" cy="200366"/>
+              </a:xfrm>
+              <a:prstGeom prst="rect">
+                <a:avLst/>
+              </a:prstGeom>
+              <a:ln>
+                <a:solidFill>
+                  <a:srgbClr val="A6A6A6"/>
+                </a:solidFill>
+              </a:ln>
+            </p:spPr>
+            <p:style>
+              <a:lnRef idx="2">
+                <a:schemeClr val="dk1"/>
+              </a:lnRef>
+              <a:fillRef idx="1">
+                <a:schemeClr val="lt1"/>
+              </a:fillRef>
+              <a:effectRef idx="0">
+                <a:schemeClr val="dk1"/>
+              </a:effectRef>
+              <a:fontRef idx="minor">
+                <a:schemeClr val="dk1"/>
+              </a:fontRef>
+            </p:style>
+            <p:txBody>
+              <a:bodyPr rtlCol="0" anchor="ctr"/>
+              <a:lstStyle/>
+              <a:p>
+                <a:endParaRPr lang="en-US" sz="1200" b="1" i="1" dirty="0">
+                  <a:solidFill>
+                    <a:schemeClr val="bg1">
+                      <a:lumMod val="50000"/>
+                    </a:schemeClr>
+                  </a:solidFill>
+                </a:endParaRPr>
+              </a:p>
+            </p:txBody>
+          </p:sp>
+        </p:grpSp>
         <p:sp>
           <p:nvSpPr>
-            <p:cNvPr id="9" name="Rectangle 8"/>
+            <p:cNvPr id="19" name="Rectangle 18"/>
             <p:cNvSpPr/>
             <p:nvPr/>
           </p:nvSpPr>
           <p:spPr>
             <a:xfrm>
-              <a:off x="5079695" y="2163170"/>
-              <a:ext cx="3457388" cy="679076"/>
-            </a:xfrm>
-            <a:prstGeom prst="rect">
-              <a:avLst/>
-            </a:prstGeom>
-          </p:spPr>
-          <p:style>
-            <a:lnRef idx="2">
-              <a:schemeClr val="dk1"/>
-            </a:lnRef>
-            <a:fillRef idx="1">
-              <a:schemeClr val="lt1"/>
-            </a:fillRef>
-            <a:effectRef idx="0">
-              <a:schemeClr val="dk1"/>
-            </a:effectRef>
-            <a:fontRef idx="minor">
-              <a:schemeClr val="dk1"/>
-            </a:fontRef>
-          </p:style>
-          <p:txBody>
-            <a:bodyPr rtlCol="0" anchor="ctr"/>
-            <a:lstStyle/>
-            <a:p>
-              <a:pPr algn="ctr"/>
-              <a:r>
-                <a:rPr lang="en-US" i="1" dirty="0" smtClean="0"/>
-                <a:t>&lt;&lt;abstract&gt;&gt;</a:t>
-              </a:r>
-            </a:p>
-            <a:p>
-              <a:pPr algn="ctr"/>
-              <a:r>
-                <a:rPr lang="en-US" b="1" dirty="0" smtClean="0"/>
-                <a:t>Sorter</a:t>
-              </a:r>
-              <a:endParaRPr lang="en-US" b="1" dirty="0"/>
-            </a:p>
-          </p:txBody>
-        </p:sp>
-        <p:sp>
-          <p:nvSpPr>
-            <p:cNvPr id="10" name="Rectangle 9"/>
-            <p:cNvSpPr/>
-            <p:nvPr/>
-          </p:nvSpPr>
-          <p:spPr>
-            <a:xfrm>
-              <a:off x="5079695" y="2842245"/>
-              <a:ext cx="3457388" cy="200367"/>
-            </a:xfrm>
-            <a:prstGeom prst="rect">
-              <a:avLst/>
-            </a:prstGeom>
-          </p:spPr>
-          <p:style>
-            <a:lnRef idx="2">
-              <a:schemeClr val="dk1"/>
-            </a:lnRef>
-            <a:fillRef idx="1">
-              <a:schemeClr val="lt1"/>
-            </a:fillRef>
-            <a:effectRef idx="0">
-              <a:schemeClr val="dk1"/>
-            </a:effectRef>
-            <a:fontRef idx="minor">
-              <a:schemeClr val="dk1"/>
-            </a:fontRef>
-          </p:style>
-          <p:txBody>
-            <a:bodyPr rtlCol="0" anchor="ctr"/>
-            <a:lstStyle/>
-            <a:p>
-              <a:endParaRPr lang="en-US" sz="1200" b="1" i="1" dirty="0"/>
-            </a:p>
-          </p:txBody>
-        </p:sp>
-      </p:grpSp>
-      <p:grpSp>
-        <p:nvGrpSpPr>
-          <p:cNvPr id="69" name="Group 68"/>
-          <p:cNvGrpSpPr/>
-          <p:nvPr/>
-        </p:nvGrpSpPr>
-        <p:grpSpPr>
-          <a:xfrm>
-            <a:off x="429352" y="3599998"/>
-            <a:ext cx="1829608" cy="879442"/>
-            <a:chOff x="639961" y="3611982"/>
-            <a:chExt cx="1829608" cy="879442"/>
-          </a:xfrm>
-        </p:grpSpPr>
-        <p:sp>
-          <p:nvSpPr>
-            <p:cNvPr id="11" name="Rectangle 10"/>
-            <p:cNvSpPr/>
-            <p:nvPr/>
-          </p:nvSpPr>
-          <p:spPr>
-            <a:xfrm>
-              <a:off x="639961" y="3611982"/>
-              <a:ext cx="1829608" cy="679076"/>
-            </a:xfrm>
-            <a:prstGeom prst="rect">
-              <a:avLst/>
-            </a:prstGeom>
-          </p:spPr>
-          <p:style>
-            <a:lnRef idx="2">
-              <a:schemeClr val="dk1"/>
-            </a:lnRef>
-            <a:fillRef idx="1">
-              <a:schemeClr val="lt1"/>
-            </a:fillRef>
-            <a:effectRef idx="0">
-              <a:schemeClr val="dk1"/>
-            </a:effectRef>
-            <a:fontRef idx="minor">
-              <a:schemeClr val="dk1"/>
-            </a:fontRef>
-          </p:style>
-          <p:txBody>
-            <a:bodyPr rtlCol="0" anchor="ctr"/>
-            <a:lstStyle/>
-            <a:p>
-              <a:pPr algn="ctr"/>
-              <a:r>
-                <a:rPr lang="en-US" b="1" dirty="0" err="1" smtClean="0"/>
-                <a:t>CircularShifter</a:t>
-              </a:r>
-              <a:endParaRPr lang="en-US" b="1" dirty="0"/>
-            </a:p>
-          </p:txBody>
-        </p:sp>
-        <p:sp>
-          <p:nvSpPr>
-            <p:cNvPr id="12" name="Rectangle 11"/>
-            <p:cNvSpPr/>
-            <p:nvPr/>
-          </p:nvSpPr>
-          <p:spPr>
-            <a:xfrm>
-              <a:off x="639961" y="4291058"/>
-              <a:ext cx="1829608" cy="200366"/>
-            </a:xfrm>
-            <a:prstGeom prst="rect">
-              <a:avLst/>
-            </a:prstGeom>
-          </p:spPr>
-          <p:style>
-            <a:lnRef idx="2">
-              <a:schemeClr val="dk1"/>
-            </a:lnRef>
-            <a:fillRef idx="1">
-              <a:schemeClr val="lt1"/>
-            </a:fillRef>
-            <a:effectRef idx="0">
-              <a:schemeClr val="dk1"/>
-            </a:effectRef>
-            <a:fontRef idx="minor">
-              <a:schemeClr val="dk1"/>
-            </a:fontRef>
-          </p:style>
-          <p:txBody>
-            <a:bodyPr rtlCol="0" anchor="ctr"/>
-            <a:lstStyle/>
-            <a:p>
-              <a:endParaRPr lang="en-US" sz="1200" b="1" i="1" dirty="0"/>
-            </a:p>
-          </p:txBody>
-        </p:sp>
-      </p:grpSp>
-      <p:sp>
-        <p:nvSpPr>
-          <p:cNvPr id="13" name="Rectangle 12"/>
-          <p:cNvSpPr/>
-          <p:nvPr/>
-        </p:nvSpPr>
-        <p:spPr>
-          <a:xfrm>
-            <a:off x="429352" y="5025522"/>
-            <a:ext cx="1829608" cy="679076"/>
-          </a:xfrm>
-          <a:prstGeom prst="rect">
-            <a:avLst/>
-          </a:prstGeom>
-        </p:spPr>
-        <p:style>
-          <a:lnRef idx="2">
-            <a:schemeClr val="dk1"/>
-          </a:lnRef>
-          <a:fillRef idx="1">
-            <a:schemeClr val="lt1"/>
-          </a:fillRef>
-          <a:effectRef idx="0">
-            <a:schemeClr val="dk1"/>
-          </a:effectRef>
-          <a:fontRef idx="minor">
-            <a:schemeClr val="dk1"/>
-          </a:fontRef>
-        </p:style>
-        <p:txBody>
-          <a:bodyPr rtlCol="0" anchor="ctr"/>
-          <a:lstStyle/>
-          <a:p>
-            <a:pPr algn="ctr"/>
-            <a:r>
-              <a:rPr lang="en-US" sz="1400" b="1" dirty="0" err="1" smtClean="0"/>
-              <a:t>CircularShifter</a:t>
-            </a:r>
-            <a:r>
-              <a:rPr lang="en-US" sz="1400" b="1" dirty="0" smtClean="0"/>
-              <a:t/>
-            </a:r>
-            <a:br>
-              <a:rPr lang="en-US" sz="1400" b="1" dirty="0" smtClean="0"/>
-            </a:br>
-            <a:r>
-              <a:rPr lang="en-US" sz="1400" b="1" dirty="0" err="1" smtClean="0"/>
-              <a:t>IgnoreWords</a:t>
-            </a:r>
-            <a:endParaRPr lang="en-US" sz="1400" b="1" dirty="0"/>
-          </a:p>
-        </p:txBody>
-      </p:sp>
-      <p:sp>
-        <p:nvSpPr>
-          <p:cNvPr id="14" name="Rectangle 13"/>
-          <p:cNvSpPr/>
-          <p:nvPr/>
-        </p:nvSpPr>
-        <p:spPr>
-          <a:xfrm>
-            <a:off x="429352" y="5704598"/>
-            <a:ext cx="1829608" cy="200366"/>
-          </a:xfrm>
-          <a:prstGeom prst="rect">
-            <a:avLst/>
-          </a:prstGeom>
-        </p:spPr>
-        <p:style>
-          <a:lnRef idx="2">
-            <a:schemeClr val="dk1"/>
-          </a:lnRef>
-          <a:fillRef idx="1">
-            <a:schemeClr val="lt1"/>
-          </a:fillRef>
-          <a:effectRef idx="0">
-            <a:schemeClr val="dk1"/>
-          </a:effectRef>
-          <a:fontRef idx="minor">
-            <a:schemeClr val="dk1"/>
-          </a:fontRef>
-        </p:style>
-        <p:txBody>
-          <a:bodyPr rtlCol="0" anchor="ctr"/>
-          <a:lstStyle/>
-          <a:p>
-            <a:endParaRPr lang="en-US" sz="1200" b="1" i="1" dirty="0"/>
-          </a:p>
-        </p:txBody>
-      </p:sp>
-      <p:grpSp>
-        <p:nvGrpSpPr>
-          <p:cNvPr id="71" name="Group 70"/>
-          <p:cNvGrpSpPr/>
-          <p:nvPr/>
-        </p:nvGrpSpPr>
-        <p:grpSpPr>
-          <a:xfrm>
-            <a:off x="4950284" y="3599998"/>
-            <a:ext cx="1667505" cy="879442"/>
-            <a:chOff x="5106155" y="3575306"/>
-            <a:chExt cx="1667505" cy="879442"/>
-          </a:xfrm>
-        </p:grpSpPr>
-        <p:sp>
-          <p:nvSpPr>
-            <p:cNvPr id="15" name="Rectangle 14"/>
-            <p:cNvSpPr/>
-            <p:nvPr/>
-          </p:nvSpPr>
-          <p:spPr>
-            <a:xfrm>
-              <a:off x="5106155" y="3575306"/>
-              <a:ext cx="1667505" cy="679076"/>
-            </a:xfrm>
-            <a:prstGeom prst="rect">
-              <a:avLst/>
-            </a:prstGeom>
-          </p:spPr>
-          <p:style>
-            <a:lnRef idx="2">
-              <a:schemeClr val="dk1"/>
-            </a:lnRef>
-            <a:fillRef idx="1">
-              <a:schemeClr val="lt1"/>
-            </a:fillRef>
-            <a:effectRef idx="0">
-              <a:schemeClr val="dk1"/>
-            </a:effectRef>
-            <a:fontRef idx="minor">
-              <a:schemeClr val="dk1"/>
-            </a:fontRef>
-          </p:style>
-          <p:txBody>
-            <a:bodyPr rtlCol="0" anchor="ctr"/>
-            <a:lstStyle/>
-            <a:p>
-              <a:pPr algn="ctr"/>
-              <a:r>
-                <a:rPr lang="en-US" b="1" dirty="0" smtClean="0"/>
-                <a:t>Alphabetical</a:t>
-              </a:r>
-              <a:br>
-                <a:rPr lang="en-US" b="1" dirty="0" smtClean="0"/>
-              </a:br>
-              <a:r>
-                <a:rPr lang="en-US" b="1" dirty="0" smtClean="0"/>
-                <a:t>Sorter</a:t>
-              </a:r>
-              <a:endParaRPr lang="en-US" b="1" dirty="0"/>
-            </a:p>
-          </p:txBody>
-        </p:sp>
-        <p:sp>
-          <p:nvSpPr>
-            <p:cNvPr id="16" name="Rectangle 15"/>
-            <p:cNvSpPr/>
-            <p:nvPr/>
-          </p:nvSpPr>
-          <p:spPr>
-            <a:xfrm>
-              <a:off x="5106155" y="4254382"/>
-              <a:ext cx="1667505" cy="200366"/>
-            </a:xfrm>
-            <a:prstGeom prst="rect">
-              <a:avLst/>
-            </a:prstGeom>
-          </p:spPr>
-          <p:style>
-            <a:lnRef idx="2">
-              <a:schemeClr val="dk1"/>
-            </a:lnRef>
-            <a:fillRef idx="1">
-              <a:schemeClr val="lt1"/>
-            </a:fillRef>
-            <a:effectRef idx="0">
-              <a:schemeClr val="dk1"/>
-            </a:effectRef>
-            <a:fontRef idx="minor">
-              <a:schemeClr val="dk1"/>
-            </a:fontRef>
-          </p:style>
-          <p:txBody>
-            <a:bodyPr rtlCol="0" anchor="ctr"/>
-            <a:lstStyle/>
-            <a:p>
-              <a:endParaRPr lang="en-US" sz="1200" b="1" i="1" dirty="0"/>
-            </a:p>
-          </p:txBody>
-        </p:sp>
-      </p:grpSp>
-      <p:grpSp>
-        <p:nvGrpSpPr>
-          <p:cNvPr id="70" name="Group 69"/>
-          <p:cNvGrpSpPr/>
-          <p:nvPr/>
-        </p:nvGrpSpPr>
-        <p:grpSpPr>
-          <a:xfrm>
-            <a:off x="2688312" y="3599998"/>
-            <a:ext cx="1832620" cy="879442"/>
-            <a:chOff x="2773815" y="3611982"/>
-            <a:chExt cx="1832620" cy="879442"/>
-          </a:xfrm>
-        </p:grpSpPr>
-        <p:sp>
-          <p:nvSpPr>
-            <p:cNvPr id="17" name="Rectangle 16"/>
-            <p:cNvSpPr/>
-            <p:nvPr/>
-          </p:nvSpPr>
-          <p:spPr>
-            <a:xfrm>
-              <a:off x="2773815" y="3611982"/>
+              <a:off x="2719075" y="5015303"/>
               <a:ext cx="1832620" cy="679076"/>
-            </a:xfrm>
-            <a:prstGeom prst="rect">
-              <a:avLst/>
-            </a:prstGeom>
-            <a:ln>
-              <a:solidFill>
-                <a:srgbClr val="A6A6A6"/>
-              </a:solidFill>
-            </a:ln>
-          </p:spPr>
-          <p:style>
-            <a:lnRef idx="2">
-              <a:schemeClr val="dk1"/>
-            </a:lnRef>
-            <a:fillRef idx="1">
-              <a:schemeClr val="lt1"/>
-            </a:fillRef>
-            <a:effectRef idx="0">
-              <a:schemeClr val="dk1"/>
-            </a:effectRef>
-            <a:fontRef idx="minor">
-              <a:schemeClr val="dk1"/>
-            </a:fontRef>
-          </p:style>
-          <p:txBody>
-            <a:bodyPr rtlCol="0" anchor="ctr"/>
-            <a:lstStyle/>
-            <a:p>
-              <a:pPr algn="ctr"/>
-              <a:r>
-                <a:rPr lang="en-US" b="1" dirty="0" err="1" smtClean="0">
-                  <a:solidFill>
-                    <a:schemeClr val="bg1">
-                      <a:lumMod val="50000"/>
-                    </a:schemeClr>
-                  </a:solidFill>
-                </a:rPr>
-                <a:t>RandomShifter</a:t>
-              </a:r>
-              <a:endParaRPr lang="en-US" b="1" dirty="0">
-                <a:solidFill>
-                  <a:schemeClr val="bg1">
-                    <a:lumMod val="50000"/>
-                  </a:schemeClr>
-                </a:solidFill>
-              </a:endParaRPr>
-            </a:p>
-          </p:txBody>
-        </p:sp>
-        <p:sp>
-          <p:nvSpPr>
-            <p:cNvPr id="18" name="Rectangle 17"/>
-            <p:cNvSpPr/>
-            <p:nvPr/>
-          </p:nvSpPr>
-          <p:spPr>
-            <a:xfrm>
-              <a:off x="2773815" y="4291058"/>
-              <a:ext cx="1832620" cy="200366"/>
-            </a:xfrm>
-            <a:prstGeom prst="rect">
-              <a:avLst/>
-            </a:prstGeom>
-            <a:ln>
-              <a:solidFill>
-                <a:srgbClr val="A6A6A6"/>
-              </a:solidFill>
-            </a:ln>
-          </p:spPr>
-          <p:style>
-            <a:lnRef idx="2">
-              <a:schemeClr val="dk1"/>
-            </a:lnRef>
-            <a:fillRef idx="1">
-              <a:schemeClr val="lt1"/>
-            </a:fillRef>
-            <a:effectRef idx="0">
-              <a:schemeClr val="dk1"/>
-            </a:effectRef>
-            <a:fontRef idx="minor">
-              <a:schemeClr val="dk1"/>
-            </a:fontRef>
-          </p:style>
-          <p:txBody>
-            <a:bodyPr rtlCol="0" anchor="ctr"/>
-            <a:lstStyle/>
-            <a:p>
-              <a:endParaRPr lang="en-US" sz="1200" b="1" i="1" dirty="0">
-                <a:solidFill>
-                  <a:schemeClr val="bg1">
-                    <a:lumMod val="50000"/>
-                  </a:schemeClr>
-                </a:solidFill>
-              </a:endParaRPr>
-            </a:p>
-          </p:txBody>
-        </p:sp>
-      </p:grpSp>
-      <p:sp>
-        <p:nvSpPr>
-          <p:cNvPr id="19" name="Rectangle 18"/>
-          <p:cNvSpPr/>
-          <p:nvPr/>
-        </p:nvSpPr>
-        <p:spPr>
-          <a:xfrm>
-            <a:off x="2719075" y="5015303"/>
-            <a:ext cx="1832620" cy="679076"/>
-          </a:xfrm>
-          <a:prstGeom prst="rect">
-            <a:avLst/>
-          </a:prstGeom>
-          <a:ln>
-            <a:solidFill>
-              <a:schemeClr val="bg1">
-                <a:lumMod val="65000"/>
-              </a:schemeClr>
-            </a:solidFill>
-          </a:ln>
-        </p:spPr>
-        <p:style>
-          <a:lnRef idx="2">
-            <a:schemeClr val="dk1"/>
-          </a:lnRef>
-          <a:fillRef idx="1">
-            <a:schemeClr val="lt1"/>
-          </a:fillRef>
-          <a:effectRef idx="0">
-            <a:schemeClr val="dk1"/>
-          </a:effectRef>
-          <a:fontRef idx="minor">
-            <a:schemeClr val="dk1"/>
-          </a:fontRef>
-        </p:style>
-        <p:txBody>
-          <a:bodyPr rtlCol="0" anchor="ctr"/>
-          <a:lstStyle/>
-          <a:p>
-            <a:pPr algn="ctr"/>
-            <a:r>
-              <a:rPr lang="en-US" sz="1400" b="1" dirty="0" err="1" smtClean="0">
-                <a:solidFill>
-                  <a:schemeClr val="bg1">
-                    <a:lumMod val="50000"/>
-                  </a:schemeClr>
-                </a:solidFill>
-              </a:rPr>
-              <a:t>RandomShifter</a:t>
-            </a:r>
-            <a:r>
-              <a:rPr lang="en-US" sz="1400" b="1" dirty="0" smtClean="0">
-                <a:solidFill>
-                  <a:schemeClr val="bg1">
-                    <a:lumMod val="50000"/>
-                  </a:schemeClr>
-                </a:solidFill>
-              </a:rPr>
-              <a:t/>
-            </a:r>
-            <a:br>
-              <a:rPr lang="en-US" sz="1400" b="1" dirty="0" smtClean="0">
-                <a:solidFill>
-                  <a:schemeClr val="bg1">
-                    <a:lumMod val="50000"/>
-                  </a:schemeClr>
-                </a:solidFill>
-              </a:rPr>
-            </a:br>
-            <a:r>
-              <a:rPr lang="en-US" sz="1400" b="1" dirty="0" err="1" smtClean="0">
-                <a:solidFill>
-                  <a:schemeClr val="bg1">
-                    <a:lumMod val="50000"/>
-                  </a:schemeClr>
-                </a:solidFill>
-              </a:rPr>
-              <a:t>IgnoreWords</a:t>
-            </a:r>
-            <a:endParaRPr lang="en-US" sz="1400" b="1" dirty="0">
-              <a:solidFill>
-                <a:schemeClr val="bg1">
-                  <a:lumMod val="50000"/>
-                </a:schemeClr>
-              </a:solidFill>
-            </a:endParaRPr>
-          </a:p>
-        </p:txBody>
-      </p:sp>
-      <p:sp>
-        <p:nvSpPr>
-          <p:cNvPr id="20" name="Rectangle 19"/>
-          <p:cNvSpPr/>
-          <p:nvPr/>
-        </p:nvSpPr>
-        <p:spPr>
-          <a:xfrm>
-            <a:off x="2719075" y="5694379"/>
-            <a:ext cx="1832620" cy="200366"/>
-          </a:xfrm>
-          <a:prstGeom prst="rect">
-            <a:avLst/>
-          </a:prstGeom>
-          <a:ln>
-            <a:solidFill>
-              <a:schemeClr val="bg1">
-                <a:lumMod val="65000"/>
-              </a:schemeClr>
-            </a:solidFill>
-          </a:ln>
-        </p:spPr>
-        <p:style>
-          <a:lnRef idx="2">
-            <a:schemeClr val="dk1"/>
-          </a:lnRef>
-          <a:fillRef idx="1">
-            <a:schemeClr val="lt1"/>
-          </a:fillRef>
-          <a:effectRef idx="0">
-            <a:schemeClr val="dk1"/>
-          </a:effectRef>
-          <a:fontRef idx="minor">
-            <a:schemeClr val="dk1"/>
-          </a:fontRef>
-        </p:style>
-        <p:txBody>
-          <a:bodyPr rtlCol="0" anchor="ctr"/>
-          <a:lstStyle/>
-          <a:p>
-            <a:endParaRPr lang="en-US" sz="1200" b="1" i="1" dirty="0"/>
-          </a:p>
-        </p:txBody>
-      </p:sp>
-      <p:grpSp>
-        <p:nvGrpSpPr>
-          <p:cNvPr id="72" name="Group 71"/>
-          <p:cNvGrpSpPr/>
-          <p:nvPr/>
-        </p:nvGrpSpPr>
-        <p:grpSpPr>
-          <a:xfrm>
-            <a:off x="7047141" y="3599998"/>
-            <a:ext cx="1667505" cy="879442"/>
-            <a:chOff x="6926060" y="3569708"/>
-            <a:chExt cx="1667505" cy="879442"/>
-          </a:xfrm>
-        </p:grpSpPr>
-        <p:sp>
-          <p:nvSpPr>
-            <p:cNvPr id="21" name="Rectangle 20"/>
-            <p:cNvSpPr/>
-            <p:nvPr/>
-          </p:nvSpPr>
-          <p:spPr>
-            <a:xfrm>
-              <a:off x="6926060" y="3569708"/>
-              <a:ext cx="1667505" cy="679076"/>
             </a:xfrm>
             <a:prstGeom prst="rect">
               <a:avLst/>
@@ -5218,17 +5080,27 @@
             <a:p>
               <a:pPr algn="ctr"/>
               <a:r>
-                <a:rPr lang="en-US" sz="1200" b="1" dirty="0" smtClean="0">
+                <a:rPr lang="en-US" sz="1400" b="1" dirty="0" err="1" smtClean="0">
                   <a:solidFill>
                     <a:schemeClr val="bg1">
                       <a:lumMod val="50000"/>
                     </a:schemeClr>
                   </a:solidFill>
                 </a:rPr>
-                <a:t>Reverse </a:t>
+                <a:t>RandomShifter</a:t>
+              </a:r>
+              <a:r>
+                <a:rPr lang="en-US" sz="1400" b="1" dirty="0" smtClean="0">
+                  <a:solidFill>
+                    <a:schemeClr val="bg1">
+                      <a:lumMod val="50000"/>
+                    </a:schemeClr>
+                  </a:solidFill>
+                </a:rPr>
+                <a:t/>
               </a:r>
               <a:br>
-                <a:rPr lang="en-US" sz="1200" b="1" dirty="0" smtClean="0">
+                <a:rPr lang="en-US" sz="1400" b="1" dirty="0" smtClean="0">
                   <a:solidFill>
                     <a:schemeClr val="bg1">
                       <a:lumMod val="50000"/>
@@ -5237,35 +5109,16 @@
                 </a:rPr>
               </a:br>
               <a:r>
-                <a:rPr lang="en-US" sz="1200" b="1" dirty="0" smtClean="0">
+                <a:rPr lang="en-US" sz="1400" b="1" dirty="0" err="1" smtClean="0">
                   <a:solidFill>
                     <a:schemeClr val="bg1">
                       <a:lumMod val="50000"/>
                     </a:schemeClr>
                   </a:solidFill>
                 </a:rPr>
-                <a:t>Alphabetical</a:t>
+                <a:t>IgnoreWords</a:t>
               </a:r>
-              <a:br>
-                <a:rPr lang="en-US" sz="1200" b="1" dirty="0" smtClean="0">
-                  <a:solidFill>
-                    <a:schemeClr val="bg1">
-                      <a:lumMod val="50000"/>
-                    </a:schemeClr>
-                  </a:solidFill>
-                </a:rPr>
-              </a:br>
-              <a:r>
-                <a:rPr lang="en-US" sz="1200" b="1" dirty="0" smtClean="0">
-                  <a:solidFill>
-                    <a:schemeClr val="bg1">
-                      <a:lumMod val="50000"/>
-                    </a:schemeClr>
-                  </a:solidFill>
-                </a:rPr>
-                <a:t>Sorter</a:t>
-              </a:r>
-              <a:endParaRPr lang="en-US" sz="1200" b="1" dirty="0">
+              <a:endParaRPr lang="en-US" sz="1400" b="1" dirty="0">
                 <a:solidFill>
                   <a:schemeClr val="bg1">
                     <a:lumMod val="50000"/>
@@ -5277,14 +5130,14 @@
         </p:sp>
         <p:sp>
           <p:nvSpPr>
-            <p:cNvPr id="22" name="Rectangle 21"/>
+            <p:cNvPr id="20" name="Rectangle 19"/>
             <p:cNvSpPr/>
             <p:nvPr/>
           </p:nvSpPr>
           <p:spPr>
             <a:xfrm>
-              <a:off x="6926060" y="4248784"/>
-              <a:ext cx="1667505" cy="200366"/>
+              <a:off x="2719075" y="5694379"/>
+              <a:ext cx="1832620" cy="200366"/>
             </a:xfrm>
             <a:prstGeom prst="rect">
               <a:avLst/>
@@ -5315,716 +5168,810 @@
             <a:bodyPr rtlCol="0" anchor="ctr"/>
             <a:lstStyle/>
             <a:p>
-              <a:endParaRPr lang="en-US" sz="1200" b="1" i="1" dirty="0">
+              <a:endParaRPr lang="en-US" sz="1200" b="1" i="1" dirty="0"/>
+            </a:p>
+          </p:txBody>
+        </p:sp>
+        <p:grpSp>
+          <p:nvGrpSpPr>
+            <p:cNvPr id="72" name="Group 71"/>
+            <p:cNvGrpSpPr/>
+            <p:nvPr/>
+          </p:nvGrpSpPr>
+          <p:grpSpPr>
+            <a:xfrm>
+              <a:off x="7047141" y="3599998"/>
+              <a:ext cx="1667505" cy="879442"/>
+              <a:chOff x="6926060" y="3569708"/>
+              <a:chExt cx="1667505" cy="879442"/>
+            </a:xfrm>
+          </p:grpSpPr>
+          <p:sp>
+            <p:nvSpPr>
+              <p:cNvPr id="21" name="Rectangle 20"/>
+              <p:cNvSpPr/>
+              <p:nvPr/>
+            </p:nvSpPr>
+            <p:spPr>
+              <a:xfrm>
+                <a:off x="6926060" y="3569708"/>
+                <a:ext cx="1667505" cy="679076"/>
+              </a:xfrm>
+              <a:prstGeom prst="rect">
+                <a:avLst/>
+              </a:prstGeom>
+              <a:ln>
                 <a:solidFill>
                   <a:schemeClr val="bg1">
-                    <a:lumMod val="50000"/>
+                    <a:lumMod val="65000"/>
                   </a:schemeClr>
                 </a:solidFill>
-              </a:endParaRPr>
+              </a:ln>
+            </p:spPr>
+            <p:style>
+              <a:lnRef idx="2">
+                <a:schemeClr val="dk1"/>
+              </a:lnRef>
+              <a:fillRef idx="1">
+                <a:schemeClr val="lt1"/>
+              </a:fillRef>
+              <a:effectRef idx="0">
+                <a:schemeClr val="dk1"/>
+              </a:effectRef>
+              <a:fontRef idx="minor">
+                <a:schemeClr val="dk1"/>
+              </a:fontRef>
+            </p:style>
+            <p:txBody>
+              <a:bodyPr rtlCol="0" anchor="ctr"/>
+              <a:lstStyle/>
+              <a:p>
+                <a:pPr algn="ctr"/>
+                <a:r>
+                  <a:rPr lang="en-US" b="1" dirty="0" smtClean="0">
+                    <a:solidFill>
+                      <a:schemeClr val="bg1">
+                        <a:lumMod val="50000"/>
+                      </a:schemeClr>
+                    </a:solidFill>
+                  </a:rPr>
+                  <a:t>Popularity Sorter</a:t>
+                </a:r>
+                <a:endParaRPr lang="en-US" b="1" dirty="0">
+                  <a:solidFill>
+                    <a:schemeClr val="bg1">
+                      <a:lumMod val="50000"/>
+                    </a:schemeClr>
+                  </a:solidFill>
+                </a:endParaRPr>
+              </a:p>
+            </p:txBody>
+          </p:sp>
+          <p:sp>
+            <p:nvSpPr>
+              <p:cNvPr id="22" name="Rectangle 21"/>
+              <p:cNvSpPr/>
+              <p:nvPr/>
+            </p:nvSpPr>
+            <p:spPr>
+              <a:xfrm>
+                <a:off x="6926060" y="4248784"/>
+                <a:ext cx="1667505" cy="200366"/>
+              </a:xfrm>
+              <a:prstGeom prst="rect">
+                <a:avLst/>
+              </a:prstGeom>
+              <a:ln>
+                <a:solidFill>
+                  <a:schemeClr val="bg1">
+                    <a:lumMod val="65000"/>
+                  </a:schemeClr>
+                </a:solidFill>
+              </a:ln>
+            </p:spPr>
+            <p:style>
+              <a:lnRef idx="2">
+                <a:schemeClr val="dk1"/>
+              </a:lnRef>
+              <a:fillRef idx="1">
+                <a:schemeClr val="lt1"/>
+              </a:fillRef>
+              <a:effectRef idx="0">
+                <a:schemeClr val="dk1"/>
+              </a:effectRef>
+              <a:fontRef idx="minor">
+                <a:schemeClr val="dk1"/>
+              </a:fontRef>
+            </p:style>
+            <p:txBody>
+              <a:bodyPr rtlCol="0" anchor="ctr"/>
+              <a:lstStyle/>
+              <a:p>
+                <a:endParaRPr lang="en-US" sz="1200" b="1" i="1" dirty="0">
+                  <a:solidFill>
+                    <a:schemeClr val="bg1">
+                      <a:lumMod val="50000"/>
+                    </a:schemeClr>
+                  </a:solidFill>
+                </a:endParaRPr>
+              </a:p>
+            </p:txBody>
+          </p:sp>
+        </p:grpSp>
+        <p:cxnSp>
+          <p:nvCxnSpPr>
+            <p:cNvPr id="45" name="Straight Connector 44"/>
+            <p:cNvCxnSpPr>
+              <a:stCxn id="7" idx="0"/>
+            </p:cNvCxnSpPr>
+            <p:nvPr/>
+          </p:nvCxnSpPr>
+          <p:spPr>
+            <a:xfrm flipV="1">
+              <a:off x="2606676" y="1975492"/>
+              <a:ext cx="0" cy="187678"/>
+            </a:xfrm>
+            <a:prstGeom prst="line">
+              <a:avLst/>
+            </a:prstGeom>
+            <a:ln>
+              <a:prstDash val="dash"/>
+            </a:ln>
+          </p:spPr>
+          <p:style>
+            <a:lnRef idx="1">
+              <a:schemeClr val="dk1"/>
+            </a:lnRef>
+            <a:fillRef idx="0">
+              <a:schemeClr val="dk1"/>
+            </a:fillRef>
+            <a:effectRef idx="0">
+              <a:schemeClr val="dk1"/>
+            </a:effectRef>
+            <a:fontRef idx="minor">
+              <a:schemeClr val="tx1"/>
+            </a:fontRef>
+          </p:style>
+        </p:cxnSp>
+        <p:cxnSp>
+          <p:nvCxnSpPr>
+            <p:cNvPr id="46" name="Straight Connector 45"/>
+            <p:cNvCxnSpPr/>
+            <p:nvPr/>
+          </p:nvCxnSpPr>
+          <p:spPr>
+            <a:xfrm flipH="1">
+              <a:off x="2606676" y="1975492"/>
+              <a:ext cx="4319384" cy="0"/>
+            </a:xfrm>
+            <a:prstGeom prst="line">
+              <a:avLst/>
+            </a:prstGeom>
+            <a:ln>
+              <a:prstDash val="dash"/>
+            </a:ln>
+          </p:spPr>
+          <p:style>
+            <a:lnRef idx="1">
+              <a:schemeClr val="dk1"/>
+            </a:lnRef>
+            <a:fillRef idx="0">
+              <a:schemeClr val="dk1"/>
+            </a:fillRef>
+            <a:effectRef idx="0">
+              <a:schemeClr val="dk1"/>
+            </a:effectRef>
+            <a:fontRef idx="minor">
+              <a:schemeClr val="tx1"/>
+            </a:fontRef>
+          </p:style>
+        </p:cxnSp>
+        <p:cxnSp>
+          <p:nvCxnSpPr>
+            <p:cNvPr id="49" name="Straight Connector 48"/>
+            <p:cNvCxnSpPr/>
+            <p:nvPr/>
+          </p:nvCxnSpPr>
+          <p:spPr>
+            <a:xfrm flipV="1">
+              <a:off x="6926060" y="1975492"/>
+              <a:ext cx="0" cy="170038"/>
+            </a:xfrm>
+            <a:prstGeom prst="line">
+              <a:avLst/>
+            </a:prstGeom>
+            <a:ln>
+              <a:prstDash val="dash"/>
+            </a:ln>
+          </p:spPr>
+          <p:style>
+            <a:lnRef idx="1">
+              <a:schemeClr val="dk1"/>
+            </a:lnRef>
+            <a:fillRef idx="0">
+              <a:schemeClr val="dk1"/>
+            </a:fillRef>
+            <a:effectRef idx="0">
+              <a:schemeClr val="dk1"/>
+            </a:effectRef>
+            <a:fontRef idx="minor">
+              <a:schemeClr val="tx1"/>
+            </a:fontRef>
+          </p:style>
+        </p:cxnSp>
+        <p:sp>
+          <p:nvSpPr>
+            <p:cNvPr id="55" name="Isosceles Triangle 54"/>
+            <p:cNvSpPr/>
+            <p:nvPr/>
+          </p:nvSpPr>
+          <p:spPr>
+            <a:xfrm>
+              <a:off x="4498263" y="1702097"/>
+              <a:ext cx="147475" cy="127134"/>
+            </a:xfrm>
+            <a:prstGeom prst="triangle">
+              <a:avLst/>
+            </a:prstGeom>
+            <a:solidFill>
+              <a:schemeClr val="bg1"/>
+            </a:solidFill>
+            <a:ln>
+              <a:solidFill>
+                <a:schemeClr val="tx1"/>
+              </a:solidFill>
+            </a:ln>
+            <a:effectLst/>
+          </p:spPr>
+          <p:style>
+            <a:lnRef idx="1">
+              <a:schemeClr val="accent1"/>
+            </a:lnRef>
+            <a:fillRef idx="3">
+              <a:schemeClr val="accent1"/>
+            </a:fillRef>
+            <a:effectRef idx="2">
+              <a:schemeClr val="accent1"/>
+            </a:effectRef>
+            <a:fontRef idx="minor">
+              <a:schemeClr val="lt1"/>
+            </a:fontRef>
+          </p:style>
+          <p:txBody>
+            <a:bodyPr rtlCol="0" anchor="ctr"/>
+            <a:lstStyle/>
+            <a:p>
+              <a:pPr algn="ctr"/>
+              <a:endParaRPr lang="en-US"/>
+            </a:p>
+          </p:txBody>
+        </p:sp>
+        <p:cxnSp>
+          <p:nvCxnSpPr>
+            <p:cNvPr id="57" name="Straight Connector 56"/>
+            <p:cNvCxnSpPr/>
+            <p:nvPr/>
+          </p:nvCxnSpPr>
+          <p:spPr>
+            <a:xfrm flipV="1">
+              <a:off x="2509657" y="3130803"/>
+              <a:ext cx="6357" cy="187678"/>
+            </a:xfrm>
+            <a:prstGeom prst="line">
+              <a:avLst/>
+            </a:prstGeom>
+            <a:ln>
+              <a:prstDash val="dash"/>
+            </a:ln>
+          </p:spPr>
+          <p:style>
+            <a:lnRef idx="1">
+              <a:schemeClr val="dk1"/>
+            </a:lnRef>
+            <a:fillRef idx="0">
+              <a:schemeClr val="dk1"/>
+            </a:fillRef>
+            <a:effectRef idx="0">
+              <a:schemeClr val="dk1"/>
+            </a:effectRef>
+            <a:fontRef idx="minor">
+              <a:schemeClr val="tx1"/>
+            </a:fontRef>
+          </p:style>
+        </p:cxnSp>
+        <p:cxnSp>
+          <p:nvCxnSpPr>
+            <p:cNvPr id="58" name="Straight Connector 57"/>
+            <p:cNvCxnSpPr/>
+            <p:nvPr/>
+          </p:nvCxnSpPr>
+          <p:spPr>
+            <a:xfrm flipV="1">
+              <a:off x="1149046" y="3318481"/>
+              <a:ext cx="6357" cy="281517"/>
+            </a:xfrm>
+            <a:prstGeom prst="line">
+              <a:avLst/>
+            </a:prstGeom>
+            <a:ln>
+              <a:prstDash val="dash"/>
+            </a:ln>
+          </p:spPr>
+          <p:style>
+            <a:lnRef idx="1">
+              <a:schemeClr val="dk1"/>
+            </a:lnRef>
+            <a:fillRef idx="0">
+              <a:schemeClr val="dk1"/>
+            </a:fillRef>
+            <a:effectRef idx="0">
+              <a:schemeClr val="dk1"/>
+            </a:effectRef>
+            <a:fontRef idx="minor">
+              <a:schemeClr val="tx1"/>
+            </a:fontRef>
+          </p:style>
+        </p:cxnSp>
+        <p:cxnSp>
+          <p:nvCxnSpPr>
+            <p:cNvPr id="59" name="Straight Connector 58"/>
+            <p:cNvCxnSpPr/>
+            <p:nvPr/>
+          </p:nvCxnSpPr>
+          <p:spPr>
+            <a:xfrm flipH="1">
+              <a:off x="1149046" y="3318481"/>
+              <a:ext cx="2596937" cy="0"/>
+            </a:xfrm>
+            <a:prstGeom prst="line">
+              <a:avLst/>
+            </a:prstGeom>
+            <a:ln>
+              <a:prstDash val="dash"/>
+            </a:ln>
+          </p:spPr>
+          <p:style>
+            <a:lnRef idx="1">
+              <a:schemeClr val="dk1"/>
+            </a:lnRef>
+            <a:fillRef idx="0">
+              <a:schemeClr val="dk1"/>
+            </a:fillRef>
+            <a:effectRef idx="0">
+              <a:schemeClr val="dk1"/>
+            </a:effectRef>
+            <a:fontRef idx="minor">
+              <a:schemeClr val="tx1"/>
+            </a:fontRef>
+          </p:style>
+        </p:cxnSp>
+        <p:cxnSp>
+          <p:nvCxnSpPr>
+            <p:cNvPr id="60" name="Straight Connector 59"/>
+            <p:cNvCxnSpPr/>
+            <p:nvPr/>
+          </p:nvCxnSpPr>
+          <p:spPr>
+            <a:xfrm flipV="1">
+              <a:off x="3745982" y="3318481"/>
+              <a:ext cx="0" cy="256825"/>
+            </a:xfrm>
+            <a:prstGeom prst="line">
+              <a:avLst/>
+            </a:prstGeom>
+            <a:ln>
+              <a:prstDash val="dash"/>
+            </a:ln>
+          </p:spPr>
+          <p:style>
+            <a:lnRef idx="1">
+              <a:schemeClr val="dk1"/>
+            </a:lnRef>
+            <a:fillRef idx="0">
+              <a:schemeClr val="dk1"/>
+            </a:fillRef>
+            <a:effectRef idx="0">
+              <a:schemeClr val="dk1"/>
+            </a:effectRef>
+            <a:fontRef idx="minor">
+              <a:schemeClr val="tx1"/>
+            </a:fontRef>
+          </p:style>
+        </p:cxnSp>
+        <p:sp>
+          <p:nvSpPr>
+            <p:cNvPr id="61" name="Isosceles Triangle 60"/>
+            <p:cNvSpPr/>
+            <p:nvPr/>
+          </p:nvSpPr>
+          <p:spPr>
+            <a:xfrm>
+              <a:off x="2442994" y="3045086"/>
+              <a:ext cx="147475" cy="127134"/>
+            </a:xfrm>
+            <a:prstGeom prst="triangle">
+              <a:avLst/>
+            </a:prstGeom>
+            <a:solidFill>
+              <a:schemeClr val="bg1"/>
+            </a:solidFill>
+            <a:ln>
+              <a:solidFill>
+                <a:schemeClr val="tx1"/>
+              </a:solidFill>
+            </a:ln>
+            <a:effectLst/>
+          </p:spPr>
+          <p:style>
+            <a:lnRef idx="1">
+              <a:schemeClr val="accent1"/>
+            </a:lnRef>
+            <a:fillRef idx="3">
+              <a:schemeClr val="accent1"/>
+            </a:fillRef>
+            <a:effectRef idx="2">
+              <a:schemeClr val="accent1"/>
+            </a:effectRef>
+            <a:fontRef idx="minor">
+              <a:schemeClr val="lt1"/>
+            </a:fontRef>
+          </p:style>
+          <p:txBody>
+            <a:bodyPr rtlCol="0" anchor="ctr"/>
+            <a:lstStyle/>
+            <a:p>
+              <a:pPr algn="ctr"/>
+              <a:endParaRPr lang="en-US"/>
+            </a:p>
+          </p:txBody>
+        </p:sp>
+        <p:cxnSp>
+          <p:nvCxnSpPr>
+            <p:cNvPr id="73" name="Straight Connector 72"/>
+            <p:cNvCxnSpPr/>
+            <p:nvPr/>
+          </p:nvCxnSpPr>
+          <p:spPr>
+            <a:xfrm flipV="1">
+              <a:off x="6679931" y="3142099"/>
+              <a:ext cx="6357" cy="187678"/>
+            </a:xfrm>
+            <a:prstGeom prst="line">
+              <a:avLst/>
+            </a:prstGeom>
+            <a:ln>
+              <a:prstDash val="dash"/>
+            </a:ln>
+          </p:spPr>
+          <p:style>
+            <a:lnRef idx="1">
+              <a:schemeClr val="dk1"/>
+            </a:lnRef>
+            <a:fillRef idx="0">
+              <a:schemeClr val="dk1"/>
+            </a:fillRef>
+            <a:effectRef idx="0">
+              <a:schemeClr val="dk1"/>
+            </a:effectRef>
+            <a:fontRef idx="minor">
+              <a:schemeClr val="tx1"/>
+            </a:fontRef>
+          </p:style>
+        </p:cxnSp>
+        <p:cxnSp>
+          <p:nvCxnSpPr>
+            <p:cNvPr id="74" name="Straight Connector 73"/>
+            <p:cNvCxnSpPr/>
+            <p:nvPr/>
+          </p:nvCxnSpPr>
+          <p:spPr>
+            <a:xfrm flipV="1">
+              <a:off x="5319320" y="3329777"/>
+              <a:ext cx="6357" cy="281517"/>
+            </a:xfrm>
+            <a:prstGeom prst="line">
+              <a:avLst/>
+            </a:prstGeom>
+            <a:ln>
+              <a:prstDash val="dash"/>
+            </a:ln>
+          </p:spPr>
+          <p:style>
+            <a:lnRef idx="1">
+              <a:schemeClr val="dk1"/>
+            </a:lnRef>
+            <a:fillRef idx="0">
+              <a:schemeClr val="dk1"/>
+            </a:fillRef>
+            <a:effectRef idx="0">
+              <a:schemeClr val="dk1"/>
+            </a:effectRef>
+            <a:fontRef idx="minor">
+              <a:schemeClr val="tx1"/>
+            </a:fontRef>
+          </p:style>
+        </p:cxnSp>
+        <p:cxnSp>
+          <p:nvCxnSpPr>
+            <p:cNvPr id="75" name="Straight Connector 74"/>
+            <p:cNvCxnSpPr/>
+            <p:nvPr/>
+          </p:nvCxnSpPr>
+          <p:spPr>
+            <a:xfrm flipH="1">
+              <a:off x="5319320" y="3329777"/>
+              <a:ext cx="2596937" cy="0"/>
+            </a:xfrm>
+            <a:prstGeom prst="line">
+              <a:avLst/>
+            </a:prstGeom>
+            <a:ln>
+              <a:prstDash val="dash"/>
+            </a:ln>
+          </p:spPr>
+          <p:style>
+            <a:lnRef idx="1">
+              <a:schemeClr val="dk1"/>
+            </a:lnRef>
+            <a:fillRef idx="0">
+              <a:schemeClr val="dk1"/>
+            </a:fillRef>
+            <a:effectRef idx="0">
+              <a:schemeClr val="dk1"/>
+            </a:effectRef>
+            <a:fontRef idx="minor">
+              <a:schemeClr val="tx1"/>
+            </a:fontRef>
+          </p:style>
+        </p:cxnSp>
+        <p:cxnSp>
+          <p:nvCxnSpPr>
+            <p:cNvPr id="76" name="Straight Connector 75"/>
+            <p:cNvCxnSpPr/>
+            <p:nvPr/>
+          </p:nvCxnSpPr>
+          <p:spPr>
+            <a:xfrm flipV="1">
+              <a:off x="7916256" y="3329777"/>
+              <a:ext cx="0" cy="256825"/>
+            </a:xfrm>
+            <a:prstGeom prst="line">
+              <a:avLst/>
+            </a:prstGeom>
+            <a:ln>
+              <a:prstDash val="dash"/>
+            </a:ln>
+          </p:spPr>
+          <p:style>
+            <a:lnRef idx="1">
+              <a:schemeClr val="dk1"/>
+            </a:lnRef>
+            <a:fillRef idx="0">
+              <a:schemeClr val="dk1"/>
+            </a:fillRef>
+            <a:effectRef idx="0">
+              <a:schemeClr val="dk1"/>
+            </a:effectRef>
+            <a:fontRef idx="minor">
+              <a:schemeClr val="tx1"/>
+            </a:fontRef>
+          </p:style>
+        </p:cxnSp>
+        <p:sp>
+          <p:nvSpPr>
+            <p:cNvPr id="77" name="Isosceles Triangle 76"/>
+            <p:cNvSpPr/>
+            <p:nvPr/>
+          </p:nvSpPr>
+          <p:spPr>
+            <a:xfrm>
+              <a:off x="6613268" y="3056382"/>
+              <a:ext cx="147475" cy="127134"/>
+            </a:xfrm>
+            <a:prstGeom prst="triangle">
+              <a:avLst/>
+            </a:prstGeom>
+            <a:solidFill>
+              <a:schemeClr val="bg1"/>
+            </a:solidFill>
+            <a:ln>
+              <a:solidFill>
+                <a:schemeClr val="tx1"/>
+              </a:solidFill>
+            </a:ln>
+            <a:effectLst/>
+          </p:spPr>
+          <p:style>
+            <a:lnRef idx="1">
+              <a:schemeClr val="accent1"/>
+            </a:lnRef>
+            <a:fillRef idx="3">
+              <a:schemeClr val="accent1"/>
+            </a:fillRef>
+            <a:effectRef idx="2">
+              <a:schemeClr val="accent1"/>
+            </a:effectRef>
+            <a:fontRef idx="minor">
+              <a:schemeClr val="lt1"/>
+            </a:fontRef>
+          </p:style>
+          <p:txBody>
+            <a:bodyPr rtlCol="0" anchor="ctr"/>
+            <a:lstStyle/>
+            <a:p>
+              <a:pPr algn="ctr"/>
+              <a:endParaRPr lang="en-US"/>
+            </a:p>
+          </p:txBody>
+        </p:sp>
+        <p:cxnSp>
+          <p:nvCxnSpPr>
+            <p:cNvPr id="78" name="Straight Connector 77"/>
+            <p:cNvCxnSpPr/>
+            <p:nvPr/>
+          </p:nvCxnSpPr>
+          <p:spPr>
+            <a:xfrm flipV="1">
+              <a:off x="1314760" y="4584914"/>
+              <a:ext cx="6357" cy="440608"/>
+            </a:xfrm>
+            <a:prstGeom prst="line">
+              <a:avLst/>
+            </a:prstGeom>
+            <a:ln>
+              <a:prstDash val="dash"/>
+            </a:ln>
+          </p:spPr>
+          <p:style>
+            <a:lnRef idx="1">
+              <a:schemeClr val="dk1"/>
+            </a:lnRef>
+            <a:fillRef idx="0">
+              <a:schemeClr val="dk1"/>
+            </a:fillRef>
+            <a:effectRef idx="0">
+              <a:schemeClr val="dk1"/>
+            </a:effectRef>
+            <a:fontRef idx="minor">
+              <a:schemeClr val="tx1"/>
+            </a:fontRef>
+          </p:style>
+        </p:cxnSp>
+        <p:sp>
+          <p:nvSpPr>
+            <p:cNvPr id="79" name="Isosceles Triangle 78"/>
+            <p:cNvSpPr/>
+            <p:nvPr/>
+          </p:nvSpPr>
+          <p:spPr>
+            <a:xfrm>
+              <a:off x="1248097" y="4499197"/>
+              <a:ext cx="147475" cy="127134"/>
+            </a:xfrm>
+            <a:prstGeom prst="triangle">
+              <a:avLst/>
+            </a:prstGeom>
+            <a:solidFill>
+              <a:schemeClr val="bg1"/>
+            </a:solidFill>
+            <a:ln>
+              <a:solidFill>
+                <a:schemeClr val="tx1"/>
+              </a:solidFill>
+            </a:ln>
+            <a:effectLst/>
+          </p:spPr>
+          <p:style>
+            <a:lnRef idx="1">
+              <a:schemeClr val="accent1"/>
+            </a:lnRef>
+            <a:fillRef idx="3">
+              <a:schemeClr val="accent1"/>
+            </a:fillRef>
+            <a:effectRef idx="2">
+              <a:schemeClr val="accent1"/>
+            </a:effectRef>
+            <a:fontRef idx="minor">
+              <a:schemeClr val="lt1"/>
+            </a:fontRef>
+          </p:style>
+          <p:txBody>
+            <a:bodyPr rtlCol="0" anchor="ctr"/>
+            <a:lstStyle/>
+            <a:p>
+              <a:pPr algn="ctr"/>
+              <a:endParaRPr lang="en-US"/>
+            </a:p>
+          </p:txBody>
+        </p:sp>
+        <p:cxnSp>
+          <p:nvCxnSpPr>
+            <p:cNvPr id="81" name="Straight Connector 80"/>
+            <p:cNvCxnSpPr/>
+            <p:nvPr/>
+          </p:nvCxnSpPr>
+          <p:spPr>
+            <a:xfrm flipV="1">
+              <a:off x="3698192" y="4574695"/>
+              <a:ext cx="6357" cy="440608"/>
+            </a:xfrm>
+            <a:prstGeom prst="line">
+              <a:avLst/>
+            </a:prstGeom>
+            <a:ln>
+              <a:solidFill>
+                <a:schemeClr val="bg1">
+                  <a:lumMod val="65000"/>
+                </a:schemeClr>
+              </a:solidFill>
+              <a:prstDash val="dash"/>
+            </a:ln>
+          </p:spPr>
+          <p:style>
+            <a:lnRef idx="1">
+              <a:schemeClr val="dk1"/>
+            </a:lnRef>
+            <a:fillRef idx="0">
+              <a:schemeClr val="dk1"/>
+            </a:fillRef>
+            <a:effectRef idx="0">
+              <a:schemeClr val="dk1"/>
+            </a:effectRef>
+            <a:fontRef idx="minor">
+              <a:schemeClr val="tx1"/>
+            </a:fontRef>
+          </p:style>
+        </p:cxnSp>
+        <p:sp>
+          <p:nvSpPr>
+            <p:cNvPr id="82" name="Isosceles Triangle 81"/>
+            <p:cNvSpPr/>
+            <p:nvPr/>
+          </p:nvSpPr>
+          <p:spPr>
+            <a:xfrm>
+              <a:off x="3631529" y="4488978"/>
+              <a:ext cx="147475" cy="127134"/>
+            </a:xfrm>
+            <a:prstGeom prst="triangle">
+              <a:avLst/>
+            </a:prstGeom>
+            <a:solidFill>
+              <a:schemeClr val="bg1"/>
+            </a:solidFill>
+            <a:ln>
+              <a:solidFill>
+                <a:schemeClr val="bg1">
+                  <a:lumMod val="65000"/>
+                </a:schemeClr>
+              </a:solidFill>
+            </a:ln>
+            <a:effectLst/>
+          </p:spPr>
+          <p:style>
+            <a:lnRef idx="1">
+              <a:schemeClr val="accent1"/>
+            </a:lnRef>
+            <a:fillRef idx="3">
+              <a:schemeClr val="accent1"/>
+            </a:fillRef>
+            <a:effectRef idx="2">
+              <a:schemeClr val="accent1"/>
+            </a:effectRef>
+            <a:fontRef idx="minor">
+              <a:schemeClr val="lt1"/>
+            </a:fontRef>
+          </p:style>
+          <p:txBody>
+            <a:bodyPr rtlCol="0" anchor="ctr"/>
+            <a:lstStyle/>
+            <a:p>
+              <a:pPr algn="ctr"/>
+              <a:endParaRPr lang="en-US"/>
             </a:p>
           </p:txBody>
         </p:sp>
       </p:grpSp>
-      <p:cxnSp>
-        <p:nvCxnSpPr>
-          <p:cNvPr id="45" name="Straight Connector 44"/>
-          <p:cNvCxnSpPr>
-            <a:stCxn id="7" idx="0"/>
-          </p:cNvCxnSpPr>
-          <p:nvPr/>
-        </p:nvCxnSpPr>
-        <p:spPr>
-          <a:xfrm flipV="1">
-            <a:off x="2606676" y="1975492"/>
-            <a:ext cx="0" cy="187678"/>
-          </a:xfrm>
-          <a:prstGeom prst="line">
-            <a:avLst/>
-          </a:prstGeom>
-          <a:ln>
-            <a:prstDash val="dash"/>
-          </a:ln>
-        </p:spPr>
-        <p:style>
-          <a:lnRef idx="1">
-            <a:schemeClr val="dk1"/>
-          </a:lnRef>
-          <a:fillRef idx="0">
-            <a:schemeClr val="dk1"/>
-          </a:fillRef>
-          <a:effectRef idx="0">
-            <a:schemeClr val="dk1"/>
-          </a:effectRef>
-          <a:fontRef idx="minor">
-            <a:schemeClr val="tx1"/>
-          </a:fontRef>
-        </p:style>
-      </p:cxnSp>
-      <p:cxnSp>
-        <p:nvCxnSpPr>
-          <p:cNvPr id="46" name="Straight Connector 45"/>
-          <p:cNvCxnSpPr/>
-          <p:nvPr/>
-        </p:nvCxnSpPr>
-        <p:spPr>
-          <a:xfrm flipH="1">
-            <a:off x="2606676" y="1975492"/>
-            <a:ext cx="4319384" cy="0"/>
-          </a:xfrm>
-          <a:prstGeom prst="line">
-            <a:avLst/>
-          </a:prstGeom>
-          <a:ln>
-            <a:prstDash val="dash"/>
-          </a:ln>
-        </p:spPr>
-        <p:style>
-          <a:lnRef idx="1">
-            <a:schemeClr val="dk1"/>
-          </a:lnRef>
-          <a:fillRef idx="0">
-            <a:schemeClr val="dk1"/>
-          </a:fillRef>
-          <a:effectRef idx="0">
-            <a:schemeClr val="dk1"/>
-          </a:effectRef>
-          <a:fontRef idx="minor">
-            <a:schemeClr val="tx1"/>
-          </a:fontRef>
-        </p:style>
-      </p:cxnSp>
-      <p:cxnSp>
-        <p:nvCxnSpPr>
-          <p:cNvPr id="49" name="Straight Connector 48"/>
-          <p:cNvCxnSpPr/>
-          <p:nvPr/>
-        </p:nvCxnSpPr>
-        <p:spPr>
-          <a:xfrm flipV="1">
-            <a:off x="6926060" y="1975492"/>
-            <a:ext cx="0" cy="170038"/>
-          </a:xfrm>
-          <a:prstGeom prst="line">
-            <a:avLst/>
-          </a:prstGeom>
-          <a:ln>
-            <a:prstDash val="dash"/>
-          </a:ln>
-        </p:spPr>
-        <p:style>
-          <a:lnRef idx="1">
-            <a:schemeClr val="dk1"/>
-          </a:lnRef>
-          <a:fillRef idx="0">
-            <a:schemeClr val="dk1"/>
-          </a:fillRef>
-          <a:effectRef idx="0">
-            <a:schemeClr val="dk1"/>
-          </a:effectRef>
-          <a:fontRef idx="minor">
-            <a:schemeClr val="tx1"/>
-          </a:fontRef>
-        </p:style>
-      </p:cxnSp>
-      <p:sp>
-        <p:nvSpPr>
-          <p:cNvPr id="55" name="Isosceles Triangle 54"/>
-          <p:cNvSpPr/>
-          <p:nvPr/>
-        </p:nvSpPr>
-        <p:spPr>
-          <a:xfrm>
-            <a:off x="4498263" y="1702097"/>
-            <a:ext cx="147475" cy="127134"/>
-          </a:xfrm>
-          <a:prstGeom prst="triangle">
-            <a:avLst/>
-          </a:prstGeom>
-          <a:solidFill>
-            <a:schemeClr val="bg1"/>
-          </a:solidFill>
-          <a:ln>
-            <a:solidFill>
-              <a:schemeClr val="tx1"/>
-            </a:solidFill>
-          </a:ln>
-          <a:effectLst/>
-        </p:spPr>
-        <p:style>
-          <a:lnRef idx="1">
-            <a:schemeClr val="accent1"/>
-          </a:lnRef>
-          <a:fillRef idx="3">
-            <a:schemeClr val="accent1"/>
-          </a:fillRef>
-          <a:effectRef idx="2">
-            <a:schemeClr val="accent1"/>
-          </a:effectRef>
-          <a:fontRef idx="minor">
-            <a:schemeClr val="lt1"/>
-          </a:fontRef>
-        </p:style>
-        <p:txBody>
-          <a:bodyPr rtlCol="0" anchor="ctr"/>
-          <a:lstStyle/>
-          <a:p>
-            <a:pPr algn="ctr"/>
-            <a:endParaRPr lang="en-US"/>
-          </a:p>
-        </p:txBody>
-      </p:sp>
-      <p:cxnSp>
-        <p:nvCxnSpPr>
-          <p:cNvPr id="57" name="Straight Connector 56"/>
-          <p:cNvCxnSpPr/>
-          <p:nvPr/>
-        </p:nvCxnSpPr>
-        <p:spPr>
-          <a:xfrm flipV="1">
-            <a:off x="2509657" y="3130803"/>
-            <a:ext cx="6357" cy="187678"/>
-          </a:xfrm>
-          <a:prstGeom prst="line">
-            <a:avLst/>
-          </a:prstGeom>
-          <a:ln>
-            <a:prstDash val="dash"/>
-          </a:ln>
-        </p:spPr>
-        <p:style>
-          <a:lnRef idx="1">
-            <a:schemeClr val="dk1"/>
-          </a:lnRef>
-          <a:fillRef idx="0">
-            <a:schemeClr val="dk1"/>
-          </a:fillRef>
-          <a:effectRef idx="0">
-            <a:schemeClr val="dk1"/>
-          </a:effectRef>
-          <a:fontRef idx="minor">
-            <a:schemeClr val="tx1"/>
-          </a:fontRef>
-        </p:style>
-      </p:cxnSp>
-      <p:cxnSp>
-        <p:nvCxnSpPr>
-          <p:cNvPr id="58" name="Straight Connector 57"/>
-          <p:cNvCxnSpPr/>
-          <p:nvPr/>
-        </p:nvCxnSpPr>
-        <p:spPr>
-          <a:xfrm flipV="1">
-            <a:off x="1149046" y="3318481"/>
-            <a:ext cx="6357" cy="281517"/>
-          </a:xfrm>
-          <a:prstGeom prst="line">
-            <a:avLst/>
-          </a:prstGeom>
-          <a:ln>
-            <a:prstDash val="dash"/>
-          </a:ln>
-        </p:spPr>
-        <p:style>
-          <a:lnRef idx="1">
-            <a:schemeClr val="dk1"/>
-          </a:lnRef>
-          <a:fillRef idx="0">
-            <a:schemeClr val="dk1"/>
-          </a:fillRef>
-          <a:effectRef idx="0">
-            <a:schemeClr val="dk1"/>
-          </a:effectRef>
-          <a:fontRef idx="minor">
-            <a:schemeClr val="tx1"/>
-          </a:fontRef>
-        </p:style>
-      </p:cxnSp>
-      <p:cxnSp>
-        <p:nvCxnSpPr>
-          <p:cNvPr id="59" name="Straight Connector 58"/>
-          <p:cNvCxnSpPr/>
-          <p:nvPr/>
-        </p:nvCxnSpPr>
-        <p:spPr>
-          <a:xfrm flipH="1">
-            <a:off x="1149046" y="3318481"/>
-            <a:ext cx="2596937" cy="0"/>
-          </a:xfrm>
-          <a:prstGeom prst="line">
-            <a:avLst/>
-          </a:prstGeom>
-          <a:ln>
-            <a:prstDash val="dash"/>
-          </a:ln>
-        </p:spPr>
-        <p:style>
-          <a:lnRef idx="1">
-            <a:schemeClr val="dk1"/>
-          </a:lnRef>
-          <a:fillRef idx="0">
-            <a:schemeClr val="dk1"/>
-          </a:fillRef>
-          <a:effectRef idx="0">
-            <a:schemeClr val="dk1"/>
-          </a:effectRef>
-          <a:fontRef idx="minor">
-            <a:schemeClr val="tx1"/>
-          </a:fontRef>
-        </p:style>
-      </p:cxnSp>
-      <p:cxnSp>
-        <p:nvCxnSpPr>
-          <p:cNvPr id="60" name="Straight Connector 59"/>
-          <p:cNvCxnSpPr/>
-          <p:nvPr/>
-        </p:nvCxnSpPr>
-        <p:spPr>
-          <a:xfrm flipV="1">
-            <a:off x="3745982" y="3318481"/>
-            <a:ext cx="0" cy="256825"/>
-          </a:xfrm>
-          <a:prstGeom prst="line">
-            <a:avLst/>
-          </a:prstGeom>
-          <a:ln>
-            <a:prstDash val="dash"/>
-          </a:ln>
-        </p:spPr>
-        <p:style>
-          <a:lnRef idx="1">
-            <a:schemeClr val="dk1"/>
-          </a:lnRef>
-          <a:fillRef idx="0">
-            <a:schemeClr val="dk1"/>
-          </a:fillRef>
-          <a:effectRef idx="0">
-            <a:schemeClr val="dk1"/>
-          </a:effectRef>
-          <a:fontRef idx="minor">
-            <a:schemeClr val="tx1"/>
-          </a:fontRef>
-        </p:style>
-      </p:cxnSp>
-      <p:sp>
-        <p:nvSpPr>
-          <p:cNvPr id="61" name="Isosceles Triangle 60"/>
-          <p:cNvSpPr/>
-          <p:nvPr/>
-        </p:nvSpPr>
-        <p:spPr>
-          <a:xfrm>
-            <a:off x="2442994" y="3045086"/>
-            <a:ext cx="147475" cy="127134"/>
-          </a:xfrm>
-          <a:prstGeom prst="triangle">
-            <a:avLst/>
-          </a:prstGeom>
-          <a:solidFill>
-            <a:schemeClr val="bg1"/>
-          </a:solidFill>
-          <a:ln>
-            <a:solidFill>
-              <a:schemeClr val="tx1"/>
-            </a:solidFill>
-          </a:ln>
-          <a:effectLst/>
-        </p:spPr>
-        <p:style>
-          <a:lnRef idx="1">
-            <a:schemeClr val="accent1"/>
-          </a:lnRef>
-          <a:fillRef idx="3">
-            <a:schemeClr val="accent1"/>
-          </a:fillRef>
-          <a:effectRef idx="2">
-            <a:schemeClr val="accent1"/>
-          </a:effectRef>
-          <a:fontRef idx="minor">
-            <a:schemeClr val="lt1"/>
-          </a:fontRef>
-        </p:style>
-        <p:txBody>
-          <a:bodyPr rtlCol="0" anchor="ctr"/>
-          <a:lstStyle/>
-          <a:p>
-            <a:pPr algn="ctr"/>
-            <a:endParaRPr lang="en-US"/>
-          </a:p>
-        </p:txBody>
-      </p:sp>
-      <p:cxnSp>
-        <p:nvCxnSpPr>
-          <p:cNvPr id="73" name="Straight Connector 72"/>
-          <p:cNvCxnSpPr/>
-          <p:nvPr/>
-        </p:nvCxnSpPr>
-        <p:spPr>
-          <a:xfrm flipV="1">
-            <a:off x="6679931" y="3142099"/>
-            <a:ext cx="6357" cy="187678"/>
-          </a:xfrm>
-          <a:prstGeom prst="line">
-            <a:avLst/>
-          </a:prstGeom>
-          <a:ln>
-            <a:prstDash val="dash"/>
-          </a:ln>
-        </p:spPr>
-        <p:style>
-          <a:lnRef idx="1">
-            <a:schemeClr val="dk1"/>
-          </a:lnRef>
-          <a:fillRef idx="0">
-            <a:schemeClr val="dk1"/>
-          </a:fillRef>
-          <a:effectRef idx="0">
-            <a:schemeClr val="dk1"/>
-          </a:effectRef>
-          <a:fontRef idx="minor">
-            <a:schemeClr val="tx1"/>
-          </a:fontRef>
-        </p:style>
-      </p:cxnSp>
-      <p:cxnSp>
-        <p:nvCxnSpPr>
-          <p:cNvPr id="74" name="Straight Connector 73"/>
-          <p:cNvCxnSpPr/>
-          <p:nvPr/>
-        </p:nvCxnSpPr>
-        <p:spPr>
-          <a:xfrm flipV="1">
-            <a:off x="5319320" y="3329777"/>
-            <a:ext cx="6357" cy="281517"/>
-          </a:xfrm>
-          <a:prstGeom prst="line">
-            <a:avLst/>
-          </a:prstGeom>
-          <a:ln>
-            <a:prstDash val="dash"/>
-          </a:ln>
-        </p:spPr>
-        <p:style>
-          <a:lnRef idx="1">
-            <a:schemeClr val="dk1"/>
-          </a:lnRef>
-          <a:fillRef idx="0">
-            <a:schemeClr val="dk1"/>
-          </a:fillRef>
-          <a:effectRef idx="0">
-            <a:schemeClr val="dk1"/>
-          </a:effectRef>
-          <a:fontRef idx="minor">
-            <a:schemeClr val="tx1"/>
-          </a:fontRef>
-        </p:style>
-      </p:cxnSp>
-      <p:cxnSp>
-        <p:nvCxnSpPr>
-          <p:cNvPr id="75" name="Straight Connector 74"/>
-          <p:cNvCxnSpPr/>
-          <p:nvPr/>
-        </p:nvCxnSpPr>
-        <p:spPr>
-          <a:xfrm flipH="1">
-            <a:off x="5319320" y="3329777"/>
-            <a:ext cx="2596937" cy="0"/>
-          </a:xfrm>
-          <a:prstGeom prst="line">
-            <a:avLst/>
-          </a:prstGeom>
-          <a:ln>
-            <a:prstDash val="dash"/>
-          </a:ln>
-        </p:spPr>
-        <p:style>
-          <a:lnRef idx="1">
-            <a:schemeClr val="dk1"/>
-          </a:lnRef>
-          <a:fillRef idx="0">
-            <a:schemeClr val="dk1"/>
-          </a:fillRef>
-          <a:effectRef idx="0">
-            <a:schemeClr val="dk1"/>
-          </a:effectRef>
-          <a:fontRef idx="minor">
-            <a:schemeClr val="tx1"/>
-          </a:fontRef>
-        </p:style>
-      </p:cxnSp>
-      <p:cxnSp>
-        <p:nvCxnSpPr>
-          <p:cNvPr id="76" name="Straight Connector 75"/>
-          <p:cNvCxnSpPr/>
-          <p:nvPr/>
-        </p:nvCxnSpPr>
-        <p:spPr>
-          <a:xfrm flipV="1">
-            <a:off x="7916256" y="3329777"/>
-            <a:ext cx="0" cy="256825"/>
-          </a:xfrm>
-          <a:prstGeom prst="line">
-            <a:avLst/>
-          </a:prstGeom>
-          <a:ln>
-            <a:prstDash val="dash"/>
-          </a:ln>
-        </p:spPr>
-        <p:style>
-          <a:lnRef idx="1">
-            <a:schemeClr val="dk1"/>
-          </a:lnRef>
-          <a:fillRef idx="0">
-            <a:schemeClr val="dk1"/>
-          </a:fillRef>
-          <a:effectRef idx="0">
-            <a:schemeClr val="dk1"/>
-          </a:effectRef>
-          <a:fontRef idx="minor">
-            <a:schemeClr val="tx1"/>
-          </a:fontRef>
-        </p:style>
-      </p:cxnSp>
-      <p:sp>
-        <p:nvSpPr>
-          <p:cNvPr id="77" name="Isosceles Triangle 76"/>
-          <p:cNvSpPr/>
-          <p:nvPr/>
-        </p:nvSpPr>
-        <p:spPr>
-          <a:xfrm>
-            <a:off x="6613268" y="3056382"/>
-            <a:ext cx="147475" cy="127134"/>
-          </a:xfrm>
-          <a:prstGeom prst="triangle">
-            <a:avLst/>
-          </a:prstGeom>
-          <a:solidFill>
-            <a:schemeClr val="bg1"/>
-          </a:solidFill>
-          <a:ln>
-            <a:solidFill>
-              <a:schemeClr val="tx1"/>
-            </a:solidFill>
-          </a:ln>
-          <a:effectLst/>
-        </p:spPr>
-        <p:style>
-          <a:lnRef idx="1">
-            <a:schemeClr val="accent1"/>
-          </a:lnRef>
-          <a:fillRef idx="3">
-            <a:schemeClr val="accent1"/>
-          </a:fillRef>
-          <a:effectRef idx="2">
-            <a:schemeClr val="accent1"/>
-          </a:effectRef>
-          <a:fontRef idx="minor">
-            <a:schemeClr val="lt1"/>
-          </a:fontRef>
-        </p:style>
-        <p:txBody>
-          <a:bodyPr rtlCol="0" anchor="ctr"/>
-          <a:lstStyle/>
-          <a:p>
-            <a:pPr algn="ctr"/>
-            <a:endParaRPr lang="en-US"/>
-          </a:p>
-        </p:txBody>
-      </p:sp>
-      <p:cxnSp>
-        <p:nvCxnSpPr>
-          <p:cNvPr id="78" name="Straight Connector 77"/>
-          <p:cNvCxnSpPr/>
-          <p:nvPr/>
-        </p:nvCxnSpPr>
-        <p:spPr>
-          <a:xfrm flipV="1">
-            <a:off x="1314760" y="4584914"/>
-            <a:ext cx="6357" cy="440608"/>
-          </a:xfrm>
-          <a:prstGeom prst="line">
-            <a:avLst/>
-          </a:prstGeom>
-          <a:ln>
-            <a:prstDash val="dash"/>
-          </a:ln>
-        </p:spPr>
-        <p:style>
-          <a:lnRef idx="1">
-            <a:schemeClr val="dk1"/>
-          </a:lnRef>
-          <a:fillRef idx="0">
-            <a:schemeClr val="dk1"/>
-          </a:fillRef>
-          <a:effectRef idx="0">
-            <a:schemeClr val="dk1"/>
-          </a:effectRef>
-          <a:fontRef idx="minor">
-            <a:schemeClr val="tx1"/>
-          </a:fontRef>
-        </p:style>
-      </p:cxnSp>
-      <p:sp>
-        <p:nvSpPr>
-          <p:cNvPr id="79" name="Isosceles Triangle 78"/>
-          <p:cNvSpPr/>
-          <p:nvPr/>
-        </p:nvSpPr>
-        <p:spPr>
-          <a:xfrm>
-            <a:off x="1248097" y="4499197"/>
-            <a:ext cx="147475" cy="127134"/>
-          </a:xfrm>
-          <a:prstGeom prst="triangle">
-            <a:avLst/>
-          </a:prstGeom>
-          <a:solidFill>
-            <a:schemeClr val="bg1"/>
-          </a:solidFill>
-          <a:ln>
-            <a:solidFill>
-              <a:schemeClr val="tx1"/>
-            </a:solidFill>
-          </a:ln>
-          <a:effectLst/>
-        </p:spPr>
-        <p:style>
-          <a:lnRef idx="1">
-            <a:schemeClr val="accent1"/>
-          </a:lnRef>
-          <a:fillRef idx="3">
-            <a:schemeClr val="accent1"/>
-          </a:fillRef>
-          <a:effectRef idx="2">
-            <a:schemeClr val="accent1"/>
-          </a:effectRef>
-          <a:fontRef idx="minor">
-            <a:schemeClr val="lt1"/>
-          </a:fontRef>
-        </p:style>
-        <p:txBody>
-          <a:bodyPr rtlCol="0" anchor="ctr"/>
-          <a:lstStyle/>
-          <a:p>
-            <a:pPr algn="ctr"/>
-            <a:endParaRPr lang="en-US"/>
-          </a:p>
-        </p:txBody>
-      </p:sp>
-      <p:cxnSp>
-        <p:nvCxnSpPr>
-          <p:cNvPr id="81" name="Straight Connector 80"/>
-          <p:cNvCxnSpPr/>
-          <p:nvPr/>
-        </p:nvCxnSpPr>
-        <p:spPr>
-          <a:xfrm flipV="1">
-            <a:off x="3698192" y="4574695"/>
-            <a:ext cx="6357" cy="440608"/>
-          </a:xfrm>
-          <a:prstGeom prst="line">
-            <a:avLst/>
-          </a:prstGeom>
-          <a:ln>
-            <a:solidFill>
-              <a:schemeClr val="bg1">
-                <a:lumMod val="65000"/>
-              </a:schemeClr>
-            </a:solidFill>
-            <a:prstDash val="dash"/>
-          </a:ln>
-        </p:spPr>
-        <p:style>
-          <a:lnRef idx="1">
-            <a:schemeClr val="dk1"/>
-          </a:lnRef>
-          <a:fillRef idx="0">
-            <a:schemeClr val="dk1"/>
-          </a:fillRef>
-          <a:effectRef idx="0">
-            <a:schemeClr val="dk1"/>
-          </a:effectRef>
-          <a:fontRef idx="minor">
-            <a:schemeClr val="tx1"/>
-          </a:fontRef>
-        </p:style>
-      </p:cxnSp>
-      <p:sp>
-        <p:nvSpPr>
-          <p:cNvPr id="82" name="Isosceles Triangle 81"/>
-          <p:cNvSpPr/>
-          <p:nvPr/>
-        </p:nvSpPr>
-        <p:spPr>
-          <a:xfrm>
-            <a:off x="3631529" y="4488978"/>
-            <a:ext cx="147475" cy="127134"/>
-          </a:xfrm>
-          <a:prstGeom prst="triangle">
-            <a:avLst/>
-          </a:prstGeom>
-          <a:solidFill>
-            <a:schemeClr val="bg1"/>
-          </a:solidFill>
-          <a:ln>
-            <a:solidFill>
-              <a:schemeClr val="bg1">
-                <a:lumMod val="65000"/>
-              </a:schemeClr>
-            </a:solidFill>
-          </a:ln>
-          <a:effectLst/>
-        </p:spPr>
-        <p:style>
-          <a:lnRef idx="1">
-            <a:schemeClr val="accent1"/>
-          </a:lnRef>
-          <a:fillRef idx="3">
-            <a:schemeClr val="accent1"/>
-          </a:fillRef>
-          <a:effectRef idx="2">
-            <a:schemeClr val="accent1"/>
-          </a:effectRef>
-          <a:fontRef idx="minor">
-            <a:schemeClr val="lt1"/>
-          </a:fontRef>
-        </p:style>
-        <p:txBody>
-          <a:bodyPr rtlCol="0" anchor="ctr"/>
-          <a:lstStyle/>
-          <a:p>
-            <a:pPr algn="ctr"/>
-            <a:endParaRPr lang="en-US"/>
-          </a:p>
-        </p:txBody>
-      </p:sp>
-      <p:sp>
-        <p:nvSpPr>
-          <p:cNvPr id="86" name="TextBox 85"/>
-          <p:cNvSpPr txBox="1"/>
-          <p:nvPr/>
-        </p:nvSpPr>
-        <p:spPr>
-          <a:xfrm>
-            <a:off x="1083814" y="1313846"/>
-            <a:ext cx="184666" cy="369332"/>
-          </a:xfrm>
-          <a:prstGeom prst="rect">
-            <a:avLst/>
-          </a:prstGeom>
-          <a:noFill/>
-        </p:spPr>
-        <p:txBody>
-          <a:bodyPr wrap="none" rtlCol="0">
-            <a:spAutoFit/>
-          </a:bodyPr>
-          <a:lstStyle/>
-          <a:p>
-            <a:endParaRPr lang="en-US" dirty="0"/>
-          </a:p>
-        </p:txBody>
-      </p:sp>
     </p:spTree>
     <p:extLst>
       <p:ext uri="{BB962C8B-B14F-4D97-AF65-F5344CB8AC3E}">

</xml_diff>